<commit_message>
Arranger une petite erreur
</commit_message>
<xml_diff>
--- a/SLAP.pptx
+++ b/SLAP.pptx
@@ -185,7 +185,7 @@
           <a:noFill/>
           <a:extLst>
             <a:ext uri="{909E8E84-426E-40dd-AFC4-6F175D3DCCD1}">
-              <a14:hiddenFill xmlns:a14="http://schemas.microsoft.com/office/drawing/2010/main" xmlns="">
+              <a14:hiddenFill xmlns="" xmlns:a14="http://schemas.microsoft.com/office/drawing/2010/main">
                 <a:solidFill>
                   <a:srgbClr val="FFFFFF"/>
                 </a:solidFill>
@@ -245,7 +245,7 @@
             </a:ln>
             <a:extLst>
               <a:ext uri="{91240B29-F687-4f45-9708-019B960494DF}">
-                <a14:hiddenLine xmlns:a14="http://schemas.microsoft.com/office/drawing/2010/main" xmlns="" w="9525">
+                <a14:hiddenLine xmlns="" xmlns:a14="http://schemas.microsoft.com/office/drawing/2010/main" w="9525">
                   <a:solidFill>
                     <a:srgbClr val="000000"/>
                   </a:solidFill>
@@ -335,7 +335,7 @@
             </a:ln>
             <a:extLst>
               <a:ext uri="{91240B29-F687-4f45-9708-019B960494DF}">
-                <a14:hiddenLine xmlns:a14="http://schemas.microsoft.com/office/drawing/2010/main" xmlns="" w="9525">
+                <a14:hiddenLine xmlns="" xmlns:a14="http://schemas.microsoft.com/office/drawing/2010/main" w="9525">
                   <a:solidFill>
                     <a:srgbClr val="000000"/>
                   </a:solidFill>
@@ -425,7 +425,7 @@
             </a:ln>
             <a:extLst>
               <a:ext uri="{91240B29-F687-4f45-9708-019B960494DF}">
-                <a14:hiddenLine xmlns:a14="http://schemas.microsoft.com/office/drawing/2010/main" xmlns="" w="9525">
+                <a14:hiddenLine xmlns="" xmlns:a14="http://schemas.microsoft.com/office/drawing/2010/main" w="9525">
                   <a:solidFill>
                     <a:srgbClr val="000000"/>
                   </a:solidFill>
@@ -459,7 +459,7 @@
             </a:ln>
             <a:extLst>
               <a:ext uri="{91240B29-F687-4f45-9708-019B960494DF}">
-                <a14:hiddenLine xmlns:a14="http://schemas.microsoft.com/office/drawing/2010/main" xmlns="" w="9525">
+                <a14:hiddenLine xmlns="" xmlns:a14="http://schemas.microsoft.com/office/drawing/2010/main" w="9525">
                   <a:solidFill>
                     <a:srgbClr val="000000"/>
                   </a:solidFill>
@@ -549,7 +549,7 @@
             </a:ln>
             <a:extLst>
               <a:ext uri="{91240B29-F687-4f45-9708-019B960494DF}">
-                <a14:hiddenLine xmlns:a14="http://schemas.microsoft.com/office/drawing/2010/main" xmlns="" w="9525">
+                <a14:hiddenLine xmlns="" xmlns:a14="http://schemas.microsoft.com/office/drawing/2010/main" w="9525">
                   <a:solidFill>
                     <a:srgbClr val="000000"/>
                   </a:solidFill>
@@ -611,7 +611,7 @@
             </a:ln>
             <a:extLst>
               <a:ext uri="{91240B29-F687-4f45-9708-019B960494DF}">
-                <a14:hiddenLine xmlns:a14="http://schemas.microsoft.com/office/drawing/2010/main" xmlns="" w="9525">
+                <a14:hiddenLine xmlns="" xmlns:a14="http://schemas.microsoft.com/office/drawing/2010/main" w="9525">
                   <a:solidFill>
                     <a:srgbClr val="000000"/>
                   </a:solidFill>
@@ -673,7 +673,7 @@
             </a:ln>
             <a:extLst>
               <a:ext uri="{91240B29-F687-4f45-9708-019B960494DF}">
-                <a14:hiddenLine xmlns:a14="http://schemas.microsoft.com/office/drawing/2010/main" xmlns="" w="9525">
+                <a14:hiddenLine xmlns="" xmlns:a14="http://schemas.microsoft.com/office/drawing/2010/main" w="9525">
                   <a:solidFill>
                     <a:srgbClr val="000000"/>
                   </a:solidFill>
@@ -763,7 +763,7 @@
             </a:ln>
             <a:extLst>
               <a:ext uri="{91240B29-F687-4f45-9708-019B960494DF}">
-                <a14:hiddenLine xmlns:a14="http://schemas.microsoft.com/office/drawing/2010/main" xmlns="" w="9525">
+                <a14:hiddenLine xmlns="" xmlns:a14="http://schemas.microsoft.com/office/drawing/2010/main" w="9525">
                   <a:solidFill>
                     <a:srgbClr val="000000"/>
                   </a:solidFill>
@@ -825,7 +825,7 @@
             </a:ln>
             <a:extLst>
               <a:ext uri="{91240B29-F687-4f45-9708-019B960494DF}">
-                <a14:hiddenLine xmlns:a14="http://schemas.microsoft.com/office/drawing/2010/main" xmlns="" w="9525">
+                <a14:hiddenLine xmlns="" xmlns:a14="http://schemas.microsoft.com/office/drawing/2010/main" w="9525">
                   <a:solidFill>
                     <a:srgbClr val="000000"/>
                   </a:solidFill>
@@ -887,7 +887,7 @@
             </a:ln>
             <a:extLst>
               <a:ext uri="{91240B29-F687-4f45-9708-019B960494DF}">
-                <a14:hiddenLine xmlns:a14="http://schemas.microsoft.com/office/drawing/2010/main" xmlns="" w="9525">
+                <a14:hiddenLine xmlns="" xmlns:a14="http://schemas.microsoft.com/office/drawing/2010/main" w="9525">
                   <a:solidFill>
                     <a:srgbClr val="000000"/>
                   </a:solidFill>
@@ -977,7 +977,7 @@
             </a:ln>
             <a:extLst>
               <a:ext uri="{91240B29-F687-4f45-9708-019B960494DF}">
-                <a14:hiddenLine xmlns:a14="http://schemas.microsoft.com/office/drawing/2010/main" xmlns="" w="9525">
+                <a14:hiddenLine xmlns="" xmlns:a14="http://schemas.microsoft.com/office/drawing/2010/main" w="9525">
                   <a:solidFill>
                     <a:srgbClr val="000000"/>
                   </a:solidFill>
@@ -1067,7 +1067,7 @@
             </a:ln>
             <a:extLst>
               <a:ext uri="{91240B29-F687-4f45-9708-019B960494DF}">
-                <a14:hiddenLine xmlns:a14="http://schemas.microsoft.com/office/drawing/2010/main" xmlns="" w="9525">
+                <a14:hiddenLine xmlns="" xmlns:a14="http://schemas.microsoft.com/office/drawing/2010/main" w="9525">
                   <a:solidFill>
                     <a:srgbClr val="000000"/>
                   </a:solidFill>
@@ -1129,7 +1129,7 @@
             </a:ln>
             <a:extLst>
               <a:ext uri="{91240B29-F687-4f45-9708-019B960494DF}">
-                <a14:hiddenLine xmlns:a14="http://schemas.microsoft.com/office/drawing/2010/main" xmlns="" w="9525">
+                <a14:hiddenLine xmlns="" xmlns:a14="http://schemas.microsoft.com/office/drawing/2010/main" w="9525">
                   <a:solidFill>
                     <a:srgbClr val="000000"/>
                   </a:solidFill>
@@ -1239,7 +1239,7 @@
             </a:ln>
             <a:extLst>
               <a:ext uri="{91240B29-F687-4f45-9708-019B960494DF}">
-                <a14:hiddenLine xmlns:a14="http://schemas.microsoft.com/office/drawing/2010/main" xmlns="" w="9525">
+                <a14:hiddenLine xmlns="" xmlns:a14="http://schemas.microsoft.com/office/drawing/2010/main" w="9525">
                   <a:solidFill>
                     <a:srgbClr val="000000"/>
                   </a:solidFill>
@@ -1301,7 +1301,7 @@
             </a:ln>
             <a:extLst>
               <a:ext uri="{91240B29-F687-4f45-9708-019B960494DF}">
-                <a14:hiddenLine xmlns:a14="http://schemas.microsoft.com/office/drawing/2010/main" xmlns="" w="9525">
+                <a14:hiddenLine xmlns="" xmlns:a14="http://schemas.microsoft.com/office/drawing/2010/main" w="9525">
                   <a:solidFill>
                     <a:srgbClr val="000000"/>
                   </a:solidFill>
@@ -1391,7 +1391,7 @@
             </a:ln>
             <a:extLst>
               <a:ext uri="{91240B29-F687-4f45-9708-019B960494DF}">
-                <a14:hiddenLine xmlns:a14="http://schemas.microsoft.com/office/drawing/2010/main" xmlns="" w="9525">
+                <a14:hiddenLine xmlns="" xmlns:a14="http://schemas.microsoft.com/office/drawing/2010/main" w="9525">
                   <a:solidFill>
                     <a:srgbClr val="000000"/>
                   </a:solidFill>
@@ -1481,7 +1481,7 @@
             </a:ln>
             <a:extLst>
               <a:ext uri="{91240B29-F687-4f45-9708-019B960494DF}">
-                <a14:hiddenLine xmlns:a14="http://schemas.microsoft.com/office/drawing/2010/main" xmlns="" w="9525">
+                <a14:hiddenLine xmlns="" xmlns:a14="http://schemas.microsoft.com/office/drawing/2010/main" w="9525">
                   <a:solidFill>
                     <a:srgbClr val="000000"/>
                   </a:solidFill>
@@ -1543,7 +1543,7 @@
             </a:ln>
             <a:extLst>
               <a:ext uri="{91240B29-F687-4f45-9708-019B960494DF}">
-                <a14:hiddenLine xmlns:a14="http://schemas.microsoft.com/office/drawing/2010/main" xmlns="" w="9525">
+                <a14:hiddenLine xmlns="" xmlns:a14="http://schemas.microsoft.com/office/drawing/2010/main" w="9525">
                   <a:solidFill>
                     <a:srgbClr val="000000"/>
                   </a:solidFill>
@@ -1633,7 +1633,7 @@
             </a:ln>
             <a:extLst>
               <a:ext uri="{91240B29-F687-4f45-9708-019B960494DF}">
-                <a14:hiddenLine xmlns:a14="http://schemas.microsoft.com/office/drawing/2010/main" xmlns="" w="9525">
+                <a14:hiddenLine xmlns="" xmlns:a14="http://schemas.microsoft.com/office/drawing/2010/main" w="9525">
                   <a:solidFill>
                     <a:srgbClr val="000000"/>
                   </a:solidFill>
@@ -1723,7 +1723,7 @@
             </a:ln>
             <a:extLst>
               <a:ext uri="{91240B29-F687-4f45-9708-019B960494DF}">
-                <a14:hiddenLine xmlns:a14="http://schemas.microsoft.com/office/drawing/2010/main" xmlns="" w="9525">
+                <a14:hiddenLine xmlns="" xmlns:a14="http://schemas.microsoft.com/office/drawing/2010/main" w="9525">
                   <a:solidFill>
                     <a:srgbClr val="000000"/>
                   </a:solidFill>
@@ -1779,7 +1779,7 @@
             </a:ln>
             <a:extLst>
               <a:ext uri="{91240B29-F687-4f45-9708-019B960494DF}">
-                <a14:hiddenLine xmlns:a14="http://schemas.microsoft.com/office/drawing/2010/main" xmlns="" w="9525">
+                <a14:hiddenLine xmlns="" xmlns:a14="http://schemas.microsoft.com/office/drawing/2010/main" w="9525">
                   <a:solidFill>
                     <a:srgbClr val="000000"/>
                   </a:solidFill>
@@ -1869,7 +1869,7 @@
             </a:ln>
             <a:extLst>
               <a:ext uri="{91240B29-F687-4f45-9708-019B960494DF}">
-                <a14:hiddenLine xmlns:a14="http://schemas.microsoft.com/office/drawing/2010/main" xmlns="" w="9525">
+                <a14:hiddenLine xmlns="" xmlns:a14="http://schemas.microsoft.com/office/drawing/2010/main" w="9525">
                   <a:solidFill>
                     <a:srgbClr val="000000"/>
                   </a:solidFill>
@@ -1925,7 +1925,7 @@
             </a:ln>
             <a:extLst>
               <a:ext uri="{91240B29-F687-4f45-9708-019B960494DF}">
-                <a14:hiddenLine xmlns:a14="http://schemas.microsoft.com/office/drawing/2010/main" xmlns="" w="9525">
+                <a14:hiddenLine xmlns="" xmlns:a14="http://schemas.microsoft.com/office/drawing/2010/main" w="9525">
                   <a:solidFill>
                     <a:srgbClr val="000000"/>
                   </a:solidFill>
@@ -2015,7 +2015,7 @@
             </a:ln>
             <a:extLst>
               <a:ext uri="{91240B29-F687-4f45-9708-019B960494DF}">
-                <a14:hiddenLine xmlns:a14="http://schemas.microsoft.com/office/drawing/2010/main" xmlns="" w="9525">
+                <a14:hiddenLine xmlns="" xmlns:a14="http://schemas.microsoft.com/office/drawing/2010/main" w="9525">
                   <a:solidFill>
                     <a:srgbClr val="000000"/>
                   </a:solidFill>
@@ -2083,7 +2083,7 @@
             </a:ln>
             <a:extLst>
               <a:ext uri="{91240B29-F687-4f45-9708-019B960494DF}">
-                <a14:hiddenLine xmlns:a14="http://schemas.microsoft.com/office/drawing/2010/main" xmlns="" w="9525">
+                <a14:hiddenLine xmlns="" xmlns:a14="http://schemas.microsoft.com/office/drawing/2010/main" w="9525">
                   <a:solidFill>
                     <a:srgbClr val="000000"/>
                   </a:solidFill>
@@ -2173,7 +2173,7 @@
             </a:ln>
             <a:extLst>
               <a:ext uri="{91240B29-F687-4f45-9708-019B960494DF}">
-                <a14:hiddenLine xmlns:a14="http://schemas.microsoft.com/office/drawing/2010/main" xmlns="" w="9525">
+                <a14:hiddenLine xmlns="" xmlns:a14="http://schemas.microsoft.com/office/drawing/2010/main" w="9525">
                   <a:solidFill>
                     <a:srgbClr val="000000"/>
                   </a:solidFill>
@@ -2241,7 +2241,7 @@
             </a:ln>
             <a:extLst>
               <a:ext uri="{91240B29-F687-4f45-9708-019B960494DF}">
-                <a14:hiddenLine xmlns:a14="http://schemas.microsoft.com/office/drawing/2010/main" xmlns="" w="9525">
+                <a14:hiddenLine xmlns="" xmlns:a14="http://schemas.microsoft.com/office/drawing/2010/main" w="9525">
                   <a:solidFill>
                     <a:srgbClr val="000000"/>
                   </a:solidFill>
@@ -2331,7 +2331,7 @@
             </a:ln>
             <a:extLst>
               <a:ext uri="{91240B29-F687-4f45-9708-019B960494DF}">
-                <a14:hiddenLine xmlns:a14="http://schemas.microsoft.com/office/drawing/2010/main" xmlns="" w="9525">
+                <a14:hiddenLine xmlns="" xmlns:a14="http://schemas.microsoft.com/office/drawing/2010/main" w="9525">
                   <a:solidFill>
                     <a:srgbClr val="000000"/>
                   </a:solidFill>
@@ -2365,7 +2365,7 @@
             </a:ln>
             <a:extLst>
               <a:ext uri="{91240B29-F687-4f45-9708-019B960494DF}">
-                <a14:hiddenLine xmlns:a14="http://schemas.microsoft.com/office/drawing/2010/main" xmlns="" w="9525">
+                <a14:hiddenLine xmlns="" xmlns:a14="http://schemas.microsoft.com/office/drawing/2010/main" w="9525">
                   <a:solidFill>
                     <a:srgbClr val="000000"/>
                   </a:solidFill>
@@ -2455,7 +2455,7 @@
             </a:ln>
             <a:extLst>
               <a:ext uri="{91240B29-F687-4f45-9708-019B960494DF}">
-                <a14:hiddenLine xmlns:a14="http://schemas.microsoft.com/office/drawing/2010/main" xmlns="" w="9525">
+                <a14:hiddenLine xmlns="" xmlns:a14="http://schemas.microsoft.com/office/drawing/2010/main" w="9525">
                   <a:solidFill>
                     <a:srgbClr val="000000"/>
                   </a:solidFill>
@@ -2517,7 +2517,7 @@
             </a:ln>
             <a:extLst>
               <a:ext uri="{91240B29-F687-4f45-9708-019B960494DF}">
-                <a14:hiddenLine xmlns:a14="http://schemas.microsoft.com/office/drawing/2010/main" xmlns="" w="9525">
+                <a14:hiddenLine xmlns="" xmlns:a14="http://schemas.microsoft.com/office/drawing/2010/main" w="9525">
                   <a:solidFill>
                     <a:srgbClr val="000000"/>
                   </a:solidFill>
@@ -2579,7 +2579,7 @@
             </a:ln>
             <a:extLst>
               <a:ext uri="{91240B29-F687-4f45-9708-019B960494DF}">
-                <a14:hiddenLine xmlns:a14="http://schemas.microsoft.com/office/drawing/2010/main" xmlns="" w="9525">
+                <a14:hiddenLine xmlns="" xmlns:a14="http://schemas.microsoft.com/office/drawing/2010/main" w="9525">
                   <a:solidFill>
                     <a:srgbClr val="000000"/>
                   </a:solidFill>
@@ -2669,7 +2669,7 @@
             </a:ln>
             <a:extLst>
               <a:ext uri="{91240B29-F687-4f45-9708-019B960494DF}">
-                <a14:hiddenLine xmlns:a14="http://schemas.microsoft.com/office/drawing/2010/main" xmlns="" w="9525">
+                <a14:hiddenLine xmlns="" xmlns:a14="http://schemas.microsoft.com/office/drawing/2010/main" w="9525">
                   <a:solidFill>
                     <a:srgbClr val="000000"/>
                   </a:solidFill>
@@ -2737,7 +2737,7 @@
             </a:ln>
             <a:extLst>
               <a:ext uri="{91240B29-F687-4f45-9708-019B960494DF}">
-                <a14:hiddenLine xmlns:a14="http://schemas.microsoft.com/office/drawing/2010/main" xmlns="" w="9525">
+                <a14:hiddenLine xmlns="" xmlns:a14="http://schemas.microsoft.com/office/drawing/2010/main" w="9525">
                   <a:solidFill>
                     <a:srgbClr val="000000"/>
                   </a:solidFill>
@@ -2799,7 +2799,7 @@
             </a:ln>
             <a:extLst>
               <a:ext uri="{91240B29-F687-4f45-9708-019B960494DF}">
-                <a14:hiddenLine xmlns:a14="http://schemas.microsoft.com/office/drawing/2010/main" xmlns="" w="9525">
+                <a14:hiddenLine xmlns="" xmlns:a14="http://schemas.microsoft.com/office/drawing/2010/main" w="9525">
                   <a:solidFill>
                     <a:srgbClr val="000000"/>
                   </a:solidFill>
@@ -2889,7 +2889,7 @@
             </a:ln>
             <a:extLst>
               <a:ext uri="{91240B29-F687-4f45-9708-019B960494DF}">
-                <a14:hiddenLine xmlns:a14="http://schemas.microsoft.com/office/drawing/2010/main" xmlns="" w="9525">
+                <a14:hiddenLine xmlns="" xmlns:a14="http://schemas.microsoft.com/office/drawing/2010/main" w="9525">
                   <a:solidFill>
                     <a:srgbClr val="000000"/>
                   </a:solidFill>
@@ -2951,7 +2951,7 @@
             </a:ln>
             <a:extLst>
               <a:ext uri="{91240B29-F687-4f45-9708-019B960494DF}">
-                <a14:hiddenLine xmlns:a14="http://schemas.microsoft.com/office/drawing/2010/main" xmlns="" w="9525">
+                <a14:hiddenLine xmlns="" xmlns:a14="http://schemas.microsoft.com/office/drawing/2010/main" w="9525">
                   <a:solidFill>
                     <a:srgbClr val="000000"/>
                   </a:solidFill>
@@ -3041,7 +3041,7 @@
             </a:ln>
             <a:extLst>
               <a:ext uri="{91240B29-F687-4f45-9708-019B960494DF}">
-                <a14:hiddenLine xmlns:a14="http://schemas.microsoft.com/office/drawing/2010/main" xmlns="" w="9525">
+                <a14:hiddenLine xmlns="" xmlns:a14="http://schemas.microsoft.com/office/drawing/2010/main" w="9525">
                   <a:solidFill>
                     <a:srgbClr val="000000"/>
                   </a:solidFill>
@@ -3103,7 +3103,7 @@
             </a:ln>
             <a:extLst>
               <a:ext uri="{91240B29-F687-4f45-9708-019B960494DF}">
-                <a14:hiddenLine xmlns:a14="http://schemas.microsoft.com/office/drawing/2010/main" xmlns="" w="9525">
+                <a14:hiddenLine xmlns="" xmlns:a14="http://schemas.microsoft.com/office/drawing/2010/main" w="9525">
                   <a:solidFill>
                     <a:srgbClr val="000000"/>
                   </a:solidFill>
@@ -3193,7 +3193,7 @@
             </a:ln>
             <a:extLst>
               <a:ext uri="{91240B29-F687-4f45-9708-019B960494DF}">
-                <a14:hiddenLine xmlns:a14="http://schemas.microsoft.com/office/drawing/2010/main" xmlns="" w="9525">
+                <a14:hiddenLine xmlns="" xmlns:a14="http://schemas.microsoft.com/office/drawing/2010/main" w="9525">
                   <a:solidFill>
                     <a:srgbClr val="000000"/>
                   </a:solidFill>
@@ -3227,7 +3227,7 @@
             </a:ln>
             <a:extLst>
               <a:ext uri="{91240B29-F687-4f45-9708-019B960494DF}">
-                <a14:hiddenLine xmlns:a14="http://schemas.microsoft.com/office/drawing/2010/main" xmlns="" w="9525">
+                <a14:hiddenLine xmlns="" xmlns:a14="http://schemas.microsoft.com/office/drawing/2010/main" w="9525">
                   <a:solidFill>
                     <a:srgbClr val="000000"/>
                   </a:solidFill>
@@ -3292,7 +3292,7 @@
             </a:ln>
             <a:extLst>
               <a:ext uri="{91240B29-F687-4f45-9708-019B960494DF}">
-                <a14:hiddenLine xmlns:a14="http://schemas.microsoft.com/office/drawing/2010/main" xmlns="" w="9525">
+                <a14:hiddenLine xmlns="" xmlns:a14="http://schemas.microsoft.com/office/drawing/2010/main" w="9525">
                   <a:solidFill>
                     <a:srgbClr val="000000"/>
                   </a:solidFill>
@@ -3382,7 +3382,7 @@
             </a:ln>
             <a:extLst>
               <a:ext uri="{91240B29-F687-4f45-9708-019B960494DF}">
-                <a14:hiddenLine xmlns:a14="http://schemas.microsoft.com/office/drawing/2010/main" xmlns="" w="9525">
+                <a14:hiddenLine xmlns="" xmlns:a14="http://schemas.microsoft.com/office/drawing/2010/main" w="9525">
                   <a:solidFill>
                     <a:srgbClr val="000000"/>
                   </a:solidFill>
@@ -3444,7 +3444,7 @@
             </a:ln>
             <a:extLst>
               <a:ext uri="{91240B29-F687-4f45-9708-019B960494DF}">
-                <a14:hiddenLine xmlns:a14="http://schemas.microsoft.com/office/drawing/2010/main" xmlns="" w="9525">
+                <a14:hiddenLine xmlns="" xmlns:a14="http://schemas.microsoft.com/office/drawing/2010/main" w="9525">
                   <a:solidFill>
                     <a:srgbClr val="000000"/>
                   </a:solidFill>
@@ -3534,7 +3534,7 @@
             </a:ln>
             <a:extLst>
               <a:ext uri="{91240B29-F687-4f45-9708-019B960494DF}">
-                <a14:hiddenLine xmlns:a14="http://schemas.microsoft.com/office/drawing/2010/main" xmlns="" w="9525">
+                <a14:hiddenLine xmlns="" xmlns:a14="http://schemas.microsoft.com/office/drawing/2010/main" w="9525">
                   <a:solidFill>
                     <a:srgbClr val="000000"/>
                   </a:solidFill>
@@ -3624,7 +3624,7 @@
             </a:ln>
             <a:extLst>
               <a:ext uri="{91240B29-F687-4f45-9708-019B960494DF}">
-                <a14:hiddenLine xmlns:a14="http://schemas.microsoft.com/office/drawing/2010/main" xmlns="" w="9525">
+                <a14:hiddenLine xmlns="" xmlns:a14="http://schemas.microsoft.com/office/drawing/2010/main" w="9525">
                   <a:solidFill>
                     <a:srgbClr val="000000"/>
                   </a:solidFill>
@@ -3689,7 +3689,7 @@
             </a:ln>
             <a:extLst>
               <a:ext uri="{91240B29-F687-4f45-9708-019B960494DF}">
-                <a14:hiddenLine xmlns:a14="http://schemas.microsoft.com/office/drawing/2010/main" xmlns="" w="9525">
+                <a14:hiddenLine xmlns="" xmlns:a14="http://schemas.microsoft.com/office/drawing/2010/main" w="9525">
                   <a:solidFill>
                     <a:srgbClr val="000000"/>
                   </a:solidFill>
@@ -3751,7 +3751,7 @@
             </a:ln>
             <a:extLst>
               <a:ext uri="{91240B29-F687-4f45-9708-019B960494DF}">
-                <a14:hiddenLine xmlns:a14="http://schemas.microsoft.com/office/drawing/2010/main" xmlns="" w="9525">
+                <a14:hiddenLine xmlns="" xmlns:a14="http://schemas.microsoft.com/office/drawing/2010/main" w="9525">
                   <a:solidFill>
                     <a:srgbClr val="000000"/>
                   </a:solidFill>
@@ -3841,7 +3841,7 @@
             </a:ln>
             <a:extLst>
               <a:ext uri="{91240B29-F687-4f45-9708-019B960494DF}">
-                <a14:hiddenLine xmlns:a14="http://schemas.microsoft.com/office/drawing/2010/main" xmlns="" w="9525">
+                <a14:hiddenLine xmlns="" xmlns:a14="http://schemas.microsoft.com/office/drawing/2010/main" w="9525">
                   <a:solidFill>
                     <a:srgbClr val="000000"/>
                   </a:solidFill>
@@ -3931,7 +3931,7 @@
             </a:ln>
             <a:extLst>
               <a:ext uri="{91240B29-F687-4f45-9708-019B960494DF}">
-                <a14:hiddenLine xmlns:a14="http://schemas.microsoft.com/office/drawing/2010/main" xmlns="" w="9525">
+                <a14:hiddenLine xmlns="" xmlns:a14="http://schemas.microsoft.com/office/drawing/2010/main" w="9525">
                   <a:solidFill>
                     <a:srgbClr val="000000"/>
                   </a:solidFill>
@@ -3993,7 +3993,7 @@
             </a:ln>
             <a:extLst>
               <a:ext uri="{91240B29-F687-4f45-9708-019B960494DF}">
-                <a14:hiddenLine xmlns:a14="http://schemas.microsoft.com/office/drawing/2010/main" xmlns="" w="9525">
+                <a14:hiddenLine xmlns="" xmlns:a14="http://schemas.microsoft.com/office/drawing/2010/main" w="9525">
                   <a:solidFill>
                     <a:srgbClr val="000000"/>
                   </a:solidFill>
@@ -4113,7 +4113,7 @@
             </a:ln>
             <a:extLst>
               <a:ext uri="{91240B29-F687-4f45-9708-019B960494DF}">
-                <a14:hiddenLine xmlns:a14="http://schemas.microsoft.com/office/drawing/2010/main" xmlns="" w="9525">
+                <a14:hiddenLine xmlns="" xmlns:a14="http://schemas.microsoft.com/office/drawing/2010/main" w="9525">
                   <a:solidFill>
                     <a:srgbClr val="000000"/>
                   </a:solidFill>
@@ -4181,7 +4181,7 @@
             </a:ln>
             <a:extLst>
               <a:ext uri="{91240B29-F687-4f45-9708-019B960494DF}">
-                <a14:hiddenLine xmlns:a14="http://schemas.microsoft.com/office/drawing/2010/main" xmlns="" w="9525">
+                <a14:hiddenLine xmlns="" xmlns:a14="http://schemas.microsoft.com/office/drawing/2010/main" w="9525">
                   <a:solidFill>
                     <a:srgbClr val="000000"/>
                   </a:solidFill>
@@ -4271,7 +4271,7 @@
             </a:ln>
             <a:extLst>
               <a:ext uri="{91240B29-F687-4f45-9708-019B960494DF}">
-                <a14:hiddenLine xmlns:a14="http://schemas.microsoft.com/office/drawing/2010/main" xmlns="" w="9525">
+                <a14:hiddenLine xmlns="" xmlns:a14="http://schemas.microsoft.com/office/drawing/2010/main" w="9525">
                   <a:solidFill>
                     <a:srgbClr val="000000"/>
                   </a:solidFill>
@@ -4411,7 +4411,7 @@
           <a:p>
             <a:fld id="{A79F242A-E88C-47E4-8C58-35E6FB715C93}" type="datetimeFigureOut">
               <a:rPr lang="fr-CA" smtClean="0"/>
-              <a:t>2017-11-20</a:t>
+              <a:t>2017-11-29</a:t>
             </a:fld>
             <a:endParaRPr lang="fr-CA"/>
           </a:p>
@@ -4678,7 +4678,7 @@
           <a:p>
             <a:fld id="{A79F242A-E88C-47E4-8C58-35E6FB715C93}" type="datetimeFigureOut">
               <a:rPr lang="fr-CA" smtClean="0"/>
-              <a:t>2017-11-20</a:t>
+              <a:t>2017-11-29</a:t>
             </a:fld>
             <a:endParaRPr lang="fr-CA"/>
           </a:p>
@@ -4874,7 +4874,7 @@
           <a:p>
             <a:fld id="{A79F242A-E88C-47E4-8C58-35E6FB715C93}" type="datetimeFigureOut">
               <a:rPr lang="fr-CA" smtClean="0"/>
-              <a:t>2017-11-20</a:t>
+              <a:t>2017-11-29</a:t>
             </a:fld>
             <a:endParaRPr lang="fr-CA"/>
           </a:p>
@@ -5137,7 +5137,7 @@
           <a:p>
             <a:fld id="{A79F242A-E88C-47E4-8C58-35E6FB715C93}" type="datetimeFigureOut">
               <a:rPr lang="fr-CA" smtClean="0"/>
-              <a:t>2017-11-20</a:t>
+              <a:t>2017-11-29</a:t>
             </a:fld>
             <a:endParaRPr lang="fr-CA"/>
           </a:p>
@@ -5571,7 +5571,7 @@
           <a:p>
             <a:fld id="{A79F242A-E88C-47E4-8C58-35E6FB715C93}" type="datetimeFigureOut">
               <a:rPr lang="fr-CA" smtClean="0"/>
-              <a:t>2017-11-20</a:t>
+              <a:t>2017-11-29</a:t>
             </a:fld>
             <a:endParaRPr lang="fr-CA"/>
           </a:p>
@@ -6117,7 +6117,7 @@
           <a:p>
             <a:fld id="{A79F242A-E88C-47E4-8C58-35E6FB715C93}" type="datetimeFigureOut">
               <a:rPr lang="fr-CA" smtClean="0"/>
-              <a:t>2017-11-20</a:t>
+              <a:t>2017-11-29</a:t>
             </a:fld>
             <a:endParaRPr lang="fr-CA"/>
           </a:p>
@@ -6837,7 +6837,7 @@
           <a:p>
             <a:fld id="{A79F242A-E88C-47E4-8C58-35E6FB715C93}" type="datetimeFigureOut">
               <a:rPr lang="fr-CA" smtClean="0"/>
-              <a:t>2017-11-20</a:t>
+              <a:t>2017-11-29</a:t>
             </a:fld>
             <a:endParaRPr lang="fr-CA"/>
           </a:p>
@@ -7007,7 +7007,7 @@
           <a:p>
             <a:fld id="{A79F242A-E88C-47E4-8C58-35E6FB715C93}" type="datetimeFigureOut">
               <a:rPr lang="fr-CA" smtClean="0"/>
-              <a:t>2017-11-20</a:t>
+              <a:t>2017-11-29</a:t>
             </a:fld>
             <a:endParaRPr lang="fr-CA"/>
           </a:p>
@@ -7187,7 +7187,7 @@
           <a:p>
             <a:fld id="{A79F242A-E88C-47E4-8C58-35E6FB715C93}" type="datetimeFigureOut">
               <a:rPr lang="fr-CA" smtClean="0"/>
-              <a:t>2017-11-20</a:t>
+              <a:t>2017-11-29</a:t>
             </a:fld>
             <a:endParaRPr lang="fr-CA"/>
           </a:p>
@@ -7357,7 +7357,7 @@
           <a:p>
             <a:fld id="{A79F242A-E88C-47E4-8C58-35E6FB715C93}" type="datetimeFigureOut">
               <a:rPr lang="fr-CA" smtClean="0"/>
-              <a:t>2017-11-20</a:t>
+              <a:t>2017-11-29</a:t>
             </a:fld>
             <a:endParaRPr lang="fr-CA"/>
           </a:p>
@@ -7607,7 +7607,7 @@
           <a:p>
             <a:fld id="{A79F242A-E88C-47E4-8C58-35E6FB715C93}" type="datetimeFigureOut">
               <a:rPr lang="fr-CA" smtClean="0"/>
-              <a:t>2017-11-20</a:t>
+              <a:t>2017-11-29</a:t>
             </a:fld>
             <a:endParaRPr lang="fr-CA"/>
           </a:p>
@@ -7839,7 +7839,7 @@
           <a:p>
             <a:fld id="{A79F242A-E88C-47E4-8C58-35E6FB715C93}" type="datetimeFigureOut">
               <a:rPr lang="fr-CA" smtClean="0"/>
-              <a:t>2017-11-20</a:t>
+              <a:t>2017-11-29</a:t>
             </a:fld>
             <a:endParaRPr lang="fr-CA"/>
           </a:p>
@@ -8220,7 +8220,7 @@
           <a:p>
             <a:fld id="{A79F242A-E88C-47E4-8C58-35E6FB715C93}" type="datetimeFigureOut">
               <a:rPr lang="fr-CA" smtClean="0"/>
-              <a:t>2017-11-20</a:t>
+              <a:t>2017-11-29</a:t>
             </a:fld>
             <a:endParaRPr lang="fr-CA"/>
           </a:p>
@@ -8338,7 +8338,7 @@
           <a:p>
             <a:fld id="{A79F242A-E88C-47E4-8C58-35E6FB715C93}" type="datetimeFigureOut">
               <a:rPr lang="fr-CA" smtClean="0"/>
-              <a:t>2017-11-20</a:t>
+              <a:t>2017-11-29</a:t>
             </a:fld>
             <a:endParaRPr lang="fr-CA"/>
           </a:p>
@@ -8433,7 +8433,7 @@
           <a:p>
             <a:fld id="{A79F242A-E88C-47E4-8C58-35E6FB715C93}" type="datetimeFigureOut">
               <a:rPr lang="fr-CA" smtClean="0"/>
-              <a:t>2017-11-20</a:t>
+              <a:t>2017-11-29</a:t>
             </a:fld>
             <a:endParaRPr lang="fr-CA"/>
           </a:p>
@@ -8682,7 +8682,7 @@
           <a:p>
             <a:fld id="{A79F242A-E88C-47E4-8C58-35E6FB715C93}" type="datetimeFigureOut">
               <a:rPr lang="fr-CA" smtClean="0"/>
-              <a:t>2017-11-20</a:t>
+              <a:t>2017-11-29</a:t>
             </a:fld>
             <a:endParaRPr lang="fr-CA"/>
           </a:p>
@@ -8962,7 +8962,7 @@
           <a:p>
             <a:fld id="{A79F242A-E88C-47E4-8C58-35E6FB715C93}" type="datetimeFigureOut">
               <a:rPr lang="fr-CA" smtClean="0"/>
-              <a:t>2017-11-20</a:t>
+              <a:t>2017-11-29</a:t>
             </a:fld>
             <a:endParaRPr lang="fr-CA"/>
           </a:p>
@@ -9078,7 +9078,7 @@
           <a:noFill/>
           <a:extLst>
             <a:ext uri="{909E8E84-426E-40dd-AFC4-6F175D3DCCD1}">
-              <a14:hiddenFill xmlns:a14="http://schemas.microsoft.com/office/drawing/2010/main" xmlns="">
+              <a14:hiddenFill xmlns="" xmlns:a14="http://schemas.microsoft.com/office/drawing/2010/main">
                 <a:solidFill>
                   <a:srgbClr val="FFFFFF"/>
                 </a:solidFill>
@@ -9152,7 +9152,7 @@
               </a:ln>
               <a:extLst>
                 <a:ext uri="{91240B29-F687-4f45-9708-019B960494DF}">
-                  <a14:hiddenLine xmlns:a14="http://schemas.microsoft.com/office/drawing/2010/main" xmlns="" w="9525">
+                  <a14:hiddenLine xmlns="" xmlns:a14="http://schemas.microsoft.com/office/drawing/2010/main" w="9525">
                     <a:solidFill>
                       <a:srgbClr val="000000"/>
                     </a:solidFill>
@@ -9242,7 +9242,7 @@
               </a:ln>
               <a:extLst>
                 <a:ext uri="{91240B29-F687-4f45-9708-019B960494DF}">
-                  <a14:hiddenLine xmlns:a14="http://schemas.microsoft.com/office/drawing/2010/main" xmlns="" w="9525">
+                  <a14:hiddenLine xmlns="" xmlns:a14="http://schemas.microsoft.com/office/drawing/2010/main" w="9525">
                     <a:solidFill>
                       <a:srgbClr val="000000"/>
                     </a:solidFill>
@@ -9332,7 +9332,7 @@
               </a:ln>
               <a:extLst>
                 <a:ext uri="{91240B29-F687-4f45-9708-019B960494DF}">
-                  <a14:hiddenLine xmlns:a14="http://schemas.microsoft.com/office/drawing/2010/main" xmlns="" w="9525">
+                  <a14:hiddenLine xmlns="" xmlns:a14="http://schemas.microsoft.com/office/drawing/2010/main" w="9525">
                     <a:solidFill>
                       <a:srgbClr val="000000"/>
                     </a:solidFill>
@@ -9394,7 +9394,7 @@
               </a:ln>
               <a:extLst>
                 <a:ext uri="{91240B29-F687-4f45-9708-019B960494DF}">
-                  <a14:hiddenLine xmlns:a14="http://schemas.microsoft.com/office/drawing/2010/main" xmlns="" w="9525">
+                  <a14:hiddenLine xmlns="" xmlns:a14="http://schemas.microsoft.com/office/drawing/2010/main" w="9525">
                     <a:solidFill>
                       <a:srgbClr val="000000"/>
                     </a:solidFill>
@@ -9484,7 +9484,7 @@
               </a:ln>
               <a:extLst>
                 <a:ext uri="{91240B29-F687-4f45-9708-019B960494DF}">
-                  <a14:hiddenLine xmlns:a14="http://schemas.microsoft.com/office/drawing/2010/main" xmlns="" w="9525">
+                  <a14:hiddenLine xmlns="" xmlns:a14="http://schemas.microsoft.com/office/drawing/2010/main" w="9525">
                     <a:solidFill>
                       <a:srgbClr val="000000"/>
                     </a:solidFill>
@@ -9546,7 +9546,7 @@
               </a:ln>
               <a:extLst>
                 <a:ext uri="{91240B29-F687-4f45-9708-019B960494DF}">
-                  <a14:hiddenLine xmlns:a14="http://schemas.microsoft.com/office/drawing/2010/main" xmlns="" w="9525">
+                  <a14:hiddenLine xmlns="" xmlns:a14="http://schemas.microsoft.com/office/drawing/2010/main" w="9525">
                     <a:solidFill>
                       <a:srgbClr val="000000"/>
                     </a:solidFill>
@@ -9608,7 +9608,7 @@
               </a:ln>
               <a:extLst>
                 <a:ext uri="{91240B29-F687-4f45-9708-019B960494DF}">
-                  <a14:hiddenLine xmlns:a14="http://schemas.microsoft.com/office/drawing/2010/main" xmlns="" w="9525">
+                  <a14:hiddenLine xmlns="" xmlns:a14="http://schemas.microsoft.com/office/drawing/2010/main" w="9525">
                     <a:solidFill>
                       <a:srgbClr val="000000"/>
                     </a:solidFill>
@@ -9698,7 +9698,7 @@
               </a:ln>
               <a:extLst>
                 <a:ext uri="{91240B29-F687-4f45-9708-019B960494DF}">
-                  <a14:hiddenLine xmlns:a14="http://schemas.microsoft.com/office/drawing/2010/main" xmlns="" w="9525">
+                  <a14:hiddenLine xmlns="" xmlns:a14="http://schemas.microsoft.com/office/drawing/2010/main" w="9525">
                     <a:solidFill>
                       <a:srgbClr val="000000"/>
                     </a:solidFill>
@@ -9788,7 +9788,7 @@
               </a:ln>
               <a:extLst>
                 <a:ext uri="{91240B29-F687-4f45-9708-019B960494DF}">
-                  <a14:hiddenLine xmlns:a14="http://schemas.microsoft.com/office/drawing/2010/main" xmlns="" w="9525">
+                  <a14:hiddenLine xmlns="" xmlns:a14="http://schemas.microsoft.com/office/drawing/2010/main" w="9525">
                     <a:solidFill>
                       <a:srgbClr val="000000"/>
                     </a:solidFill>
@@ -9850,7 +9850,7 @@
               </a:ln>
               <a:extLst>
                 <a:ext uri="{91240B29-F687-4f45-9708-019B960494DF}">
-                  <a14:hiddenLine xmlns:a14="http://schemas.microsoft.com/office/drawing/2010/main" xmlns="" w="9525">
+                  <a14:hiddenLine xmlns="" xmlns:a14="http://schemas.microsoft.com/office/drawing/2010/main" w="9525">
                     <a:solidFill>
                       <a:srgbClr val="000000"/>
                     </a:solidFill>
@@ -9960,7 +9960,7 @@
               </a:ln>
               <a:extLst>
                 <a:ext uri="{91240B29-F687-4f45-9708-019B960494DF}">
-                  <a14:hiddenLine xmlns:a14="http://schemas.microsoft.com/office/drawing/2010/main" xmlns="" w="9525">
+                  <a14:hiddenLine xmlns="" xmlns:a14="http://schemas.microsoft.com/office/drawing/2010/main" w="9525">
                     <a:solidFill>
                       <a:srgbClr val="000000"/>
                     </a:solidFill>
@@ -10044,7 +10044,7 @@
               </a:ln>
               <a:extLst>
                 <a:ext uri="{91240B29-F687-4f45-9708-019B960494DF}">
-                  <a14:hiddenLine xmlns:a14="http://schemas.microsoft.com/office/drawing/2010/main" xmlns="" w="9525">
+                  <a14:hiddenLine xmlns="" xmlns:a14="http://schemas.microsoft.com/office/drawing/2010/main" w="9525">
                     <a:solidFill>
                       <a:srgbClr val="000000"/>
                     </a:solidFill>
@@ -10106,7 +10106,7 @@
               </a:ln>
               <a:extLst>
                 <a:ext uri="{91240B29-F687-4f45-9708-019B960494DF}">
-                  <a14:hiddenLine xmlns:a14="http://schemas.microsoft.com/office/drawing/2010/main" xmlns="" w="9525">
+                  <a14:hiddenLine xmlns="" xmlns:a14="http://schemas.microsoft.com/office/drawing/2010/main" w="9525">
                     <a:solidFill>
                       <a:srgbClr val="000000"/>
                     </a:solidFill>
@@ -10168,7 +10168,7 @@
               </a:ln>
               <a:extLst>
                 <a:ext uri="{91240B29-F687-4f45-9708-019B960494DF}">
-                  <a14:hiddenLine xmlns:a14="http://schemas.microsoft.com/office/drawing/2010/main" xmlns="" w="9525">
+                  <a14:hiddenLine xmlns="" xmlns:a14="http://schemas.microsoft.com/office/drawing/2010/main" w="9525">
                     <a:solidFill>
                       <a:srgbClr val="000000"/>
                     </a:solidFill>
@@ -10258,7 +10258,7 @@
               </a:ln>
               <a:extLst>
                 <a:ext uri="{91240B29-F687-4f45-9708-019B960494DF}">
-                  <a14:hiddenLine xmlns:a14="http://schemas.microsoft.com/office/drawing/2010/main" xmlns="" w="9525">
+                  <a14:hiddenLine xmlns="" xmlns:a14="http://schemas.microsoft.com/office/drawing/2010/main" w="9525">
                     <a:solidFill>
                       <a:srgbClr val="000000"/>
                     </a:solidFill>
@@ -10292,7 +10292,7 @@
               </a:ln>
               <a:extLst>
                 <a:ext uri="{91240B29-F687-4f45-9708-019B960494DF}">
-                  <a14:hiddenLine xmlns:a14="http://schemas.microsoft.com/office/drawing/2010/main" xmlns="" w="9525">
+                  <a14:hiddenLine xmlns="" xmlns:a14="http://schemas.microsoft.com/office/drawing/2010/main" w="9525">
                     <a:solidFill>
                       <a:srgbClr val="000000"/>
                     </a:solidFill>
@@ -10357,7 +10357,7 @@
               </a:ln>
               <a:extLst>
                 <a:ext uri="{91240B29-F687-4f45-9708-019B960494DF}">
-                  <a14:hiddenLine xmlns:a14="http://schemas.microsoft.com/office/drawing/2010/main" xmlns="" w="9525">
+                  <a14:hiddenLine xmlns="" xmlns:a14="http://schemas.microsoft.com/office/drawing/2010/main" w="9525">
                     <a:solidFill>
                       <a:srgbClr val="000000"/>
                     </a:solidFill>
@@ -10447,7 +10447,7 @@
               </a:ln>
               <a:extLst>
                 <a:ext uri="{91240B29-F687-4f45-9708-019B960494DF}">
-                  <a14:hiddenLine xmlns:a14="http://schemas.microsoft.com/office/drawing/2010/main" xmlns="" w="9525">
+                  <a14:hiddenLine xmlns="" xmlns:a14="http://schemas.microsoft.com/office/drawing/2010/main" w="9525">
                     <a:solidFill>
                       <a:srgbClr val="000000"/>
                     </a:solidFill>
@@ -10509,7 +10509,7 @@
               </a:ln>
               <a:extLst>
                 <a:ext uri="{91240B29-F687-4f45-9708-019B960494DF}">
-                  <a14:hiddenLine xmlns:a14="http://schemas.microsoft.com/office/drawing/2010/main" xmlns="" w="9525">
+                  <a14:hiddenLine xmlns="" xmlns:a14="http://schemas.microsoft.com/office/drawing/2010/main" w="9525">
                     <a:solidFill>
                       <a:srgbClr val="000000"/>
                     </a:solidFill>
@@ -10599,7 +10599,7 @@
               </a:ln>
               <a:extLst>
                 <a:ext uri="{91240B29-F687-4f45-9708-019B960494DF}">
-                  <a14:hiddenLine xmlns:a14="http://schemas.microsoft.com/office/drawing/2010/main" xmlns="" w="9525">
+                  <a14:hiddenLine xmlns="" xmlns:a14="http://schemas.microsoft.com/office/drawing/2010/main" w="9525">
                     <a:solidFill>
                       <a:srgbClr val="000000"/>
                     </a:solidFill>
@@ -10664,7 +10664,7 @@
               </a:ln>
               <a:extLst>
                 <a:ext uri="{91240B29-F687-4f45-9708-019B960494DF}">
-                  <a14:hiddenLine xmlns:a14="http://schemas.microsoft.com/office/drawing/2010/main" xmlns="" w="9525">
+                  <a14:hiddenLine xmlns="" xmlns:a14="http://schemas.microsoft.com/office/drawing/2010/main" w="9525">
                     <a:solidFill>
                       <a:srgbClr val="000000"/>
                     </a:solidFill>
@@ -10726,7 +10726,7 @@
               </a:ln>
               <a:extLst>
                 <a:ext uri="{91240B29-F687-4f45-9708-019B960494DF}">
-                  <a14:hiddenLine xmlns:a14="http://schemas.microsoft.com/office/drawing/2010/main" xmlns="" w="9525">
+                  <a14:hiddenLine xmlns="" xmlns:a14="http://schemas.microsoft.com/office/drawing/2010/main" w="9525">
                     <a:solidFill>
                       <a:srgbClr val="000000"/>
                     </a:solidFill>
@@ -10816,7 +10816,7 @@
               </a:ln>
               <a:extLst>
                 <a:ext uri="{91240B29-F687-4f45-9708-019B960494DF}">
-                  <a14:hiddenLine xmlns:a14="http://schemas.microsoft.com/office/drawing/2010/main" xmlns="" w="9525">
+                  <a14:hiddenLine xmlns="" xmlns:a14="http://schemas.microsoft.com/office/drawing/2010/main" w="9525">
                     <a:solidFill>
                       <a:srgbClr val="000000"/>
                     </a:solidFill>
@@ -10906,7 +10906,7 @@
               </a:ln>
               <a:extLst>
                 <a:ext uri="{91240B29-F687-4f45-9708-019B960494DF}">
-                  <a14:hiddenLine xmlns:a14="http://schemas.microsoft.com/office/drawing/2010/main" xmlns="" w="9525">
+                  <a14:hiddenLine xmlns="" xmlns:a14="http://schemas.microsoft.com/office/drawing/2010/main" w="9525">
                     <a:solidFill>
                       <a:srgbClr val="000000"/>
                     </a:solidFill>
@@ -10971,7 +10971,7 @@
               </a:ln>
               <a:extLst>
                 <a:ext uri="{91240B29-F687-4f45-9708-019B960494DF}">
-                  <a14:hiddenLine xmlns:a14="http://schemas.microsoft.com/office/drawing/2010/main" xmlns="" w="9525">
+                  <a14:hiddenLine xmlns="" xmlns:a14="http://schemas.microsoft.com/office/drawing/2010/main" w="9525">
                     <a:solidFill>
                       <a:srgbClr val="000000"/>
                     </a:solidFill>
@@ -11091,7 +11091,7 @@
               </a:ln>
               <a:extLst>
                 <a:ext uri="{91240B29-F687-4f45-9708-019B960494DF}">
-                  <a14:hiddenLine xmlns:a14="http://schemas.microsoft.com/office/drawing/2010/main" xmlns="" w="9525">
+                  <a14:hiddenLine xmlns="" xmlns:a14="http://schemas.microsoft.com/office/drawing/2010/main" w="9525">
                     <a:solidFill>
                       <a:srgbClr val="000000"/>
                     </a:solidFill>
@@ -11189,7 +11189,7 @@
               </a:ln>
               <a:extLst>
                 <a:ext uri="{91240B29-F687-4f45-9708-019B960494DF}">
-                  <a14:hiddenLine xmlns:a14="http://schemas.microsoft.com/office/drawing/2010/main" xmlns="" w="9525">
+                  <a14:hiddenLine xmlns="" xmlns:a14="http://schemas.microsoft.com/office/drawing/2010/main" w="9525">
                     <a:solidFill>
                       <a:srgbClr val="000000"/>
                     </a:solidFill>
@@ -11304,7 +11304,7 @@
               </a:ln>
               <a:extLst>
                 <a:ext uri="{91240B29-F687-4f45-9708-019B960494DF}">
-                  <a14:hiddenLine xmlns:a14="http://schemas.microsoft.com/office/drawing/2010/main" xmlns="" w="9525">
+                  <a14:hiddenLine xmlns="" xmlns:a14="http://schemas.microsoft.com/office/drawing/2010/main" w="9525">
                     <a:solidFill>
                       <a:srgbClr val="000000"/>
                     </a:solidFill>
@@ -11394,7 +11394,7 @@
               </a:ln>
               <a:extLst>
                 <a:ext uri="{91240B29-F687-4f45-9708-019B960494DF}">
-                  <a14:hiddenLine xmlns:a14="http://schemas.microsoft.com/office/drawing/2010/main" xmlns="" w="9525">
+                  <a14:hiddenLine xmlns="" xmlns:a14="http://schemas.microsoft.com/office/drawing/2010/main" w="9525">
                     <a:solidFill>
                       <a:srgbClr val="000000"/>
                     </a:solidFill>
@@ -11459,7 +11459,7 @@
               </a:ln>
               <a:extLst>
                 <a:ext uri="{91240B29-F687-4f45-9708-019B960494DF}">
-                  <a14:hiddenLine xmlns:a14="http://schemas.microsoft.com/office/drawing/2010/main" xmlns="" w="9525">
+                  <a14:hiddenLine xmlns="" xmlns:a14="http://schemas.microsoft.com/office/drawing/2010/main" w="9525">
                     <a:solidFill>
                       <a:srgbClr val="000000"/>
                     </a:solidFill>
@@ -11549,7 +11549,7 @@
               </a:ln>
               <a:extLst>
                 <a:ext uri="{91240B29-F687-4f45-9708-019B960494DF}">
-                  <a14:hiddenLine xmlns:a14="http://schemas.microsoft.com/office/drawing/2010/main" xmlns="" w="9525">
+                  <a14:hiddenLine xmlns="" xmlns:a14="http://schemas.microsoft.com/office/drawing/2010/main" w="9525">
                     <a:solidFill>
                       <a:srgbClr val="000000"/>
                     </a:solidFill>
@@ -11617,7 +11617,7 @@
               </a:ln>
               <a:extLst>
                 <a:ext uri="{91240B29-F687-4f45-9708-019B960494DF}">
-                  <a14:hiddenLine xmlns:a14="http://schemas.microsoft.com/office/drawing/2010/main" xmlns="" w="9525">
+                  <a14:hiddenLine xmlns="" xmlns:a14="http://schemas.microsoft.com/office/drawing/2010/main" w="9525">
                     <a:solidFill>
                       <a:srgbClr val="000000"/>
                     </a:solidFill>
@@ -11707,7 +11707,7 @@
               </a:ln>
               <a:extLst>
                 <a:ext uri="{91240B29-F687-4f45-9708-019B960494DF}">
-                  <a14:hiddenLine xmlns:a14="http://schemas.microsoft.com/office/drawing/2010/main" xmlns="" w="9525">
+                  <a14:hiddenLine xmlns="" xmlns:a14="http://schemas.microsoft.com/office/drawing/2010/main" w="9525">
                     <a:solidFill>
                       <a:srgbClr val="000000"/>
                     </a:solidFill>
@@ -11775,7 +11775,7 @@
               </a:ln>
               <a:extLst>
                 <a:ext uri="{91240B29-F687-4f45-9708-019B960494DF}">
-                  <a14:hiddenLine xmlns:a14="http://schemas.microsoft.com/office/drawing/2010/main" xmlns="" w="9525">
+                  <a14:hiddenLine xmlns="" xmlns:a14="http://schemas.microsoft.com/office/drawing/2010/main" w="9525">
                     <a:solidFill>
                       <a:srgbClr val="000000"/>
                     </a:solidFill>
@@ -11865,7 +11865,7 @@
               </a:ln>
               <a:extLst>
                 <a:ext uri="{91240B29-F687-4f45-9708-019B960494DF}">
-                  <a14:hiddenLine xmlns:a14="http://schemas.microsoft.com/office/drawing/2010/main" xmlns="" w="9525">
+                  <a14:hiddenLine xmlns="" xmlns:a14="http://schemas.microsoft.com/office/drawing/2010/main" w="9525">
                     <a:solidFill>
                       <a:srgbClr val="000000"/>
                     </a:solidFill>
@@ -11899,7 +11899,7 @@
               </a:ln>
               <a:extLst>
                 <a:ext uri="{91240B29-F687-4f45-9708-019B960494DF}">
-                  <a14:hiddenLine xmlns:a14="http://schemas.microsoft.com/office/drawing/2010/main" xmlns="" w="9525">
+                  <a14:hiddenLine xmlns="" xmlns:a14="http://schemas.microsoft.com/office/drawing/2010/main" w="9525">
                     <a:solidFill>
                       <a:srgbClr val="000000"/>
                     </a:solidFill>
@@ -12039,7 +12039,7 @@
           <a:p>
             <a:fld id="{A79F242A-E88C-47E4-8C58-35E6FB715C93}" type="datetimeFigureOut">
               <a:rPr lang="fr-CA" smtClean="0"/>
-              <a:t>2017-11-20</a:t>
+              <a:t>2017-11-29</a:t>
             </a:fld>
             <a:endParaRPr lang="fr-CA"/>
           </a:p>
@@ -12788,7 +12788,7 @@
             </a:ln>
             <a:extLst>
               <a:ext uri="{91240B29-F687-4f45-9708-019B960494DF}">
-                <a14:hiddenLine xmlns:a14="http://schemas.microsoft.com/office/drawing/2010/main" xmlns:p14="http://schemas.microsoft.com/office/powerpoint/2010/main" xmlns:a16="http://schemas.microsoft.com/office/drawing/2014/main" xmlns="" w="9525">
+                <a14:hiddenLine xmlns="" xmlns:a16="http://schemas.microsoft.com/office/drawing/2014/main" xmlns:p14="http://schemas.microsoft.com/office/powerpoint/2010/main" xmlns:a14="http://schemas.microsoft.com/office/drawing/2010/main" w="9525">
                   <a:solidFill>
                     <a:srgbClr val="000000"/>
                   </a:solidFill>
@@ -12890,7 +12890,7 @@
             </a:ln>
             <a:extLst>
               <a:ext uri="{91240B29-F687-4f45-9708-019B960494DF}">
-                <a14:hiddenLine xmlns:a14="http://schemas.microsoft.com/office/drawing/2010/main" xmlns:p14="http://schemas.microsoft.com/office/powerpoint/2010/main" xmlns:a16="http://schemas.microsoft.com/office/drawing/2014/main" xmlns="" w="9525">
+                <a14:hiddenLine xmlns="" xmlns:a16="http://schemas.microsoft.com/office/drawing/2014/main" xmlns:p14="http://schemas.microsoft.com/office/powerpoint/2010/main" xmlns:a14="http://schemas.microsoft.com/office/drawing/2010/main" w="9525">
                   <a:solidFill>
                     <a:srgbClr val="000000"/>
                   </a:solidFill>
@@ -12992,7 +12992,7 @@
             </a:ln>
             <a:extLst>
               <a:ext uri="{91240B29-F687-4f45-9708-019B960494DF}">
-                <a14:hiddenLine xmlns:a14="http://schemas.microsoft.com/office/drawing/2010/main" xmlns:p14="http://schemas.microsoft.com/office/powerpoint/2010/main" xmlns:a16="http://schemas.microsoft.com/office/drawing/2014/main" xmlns="" w="9525">
+                <a14:hiddenLine xmlns="" xmlns:a16="http://schemas.microsoft.com/office/drawing/2014/main" xmlns:p14="http://schemas.microsoft.com/office/powerpoint/2010/main" xmlns:a14="http://schemas.microsoft.com/office/drawing/2010/main" w="9525">
                   <a:solidFill>
                     <a:srgbClr val="000000"/>
                   </a:solidFill>
@@ -13066,7 +13066,7 @@
             </a:ln>
             <a:extLst>
               <a:ext uri="{91240B29-F687-4f45-9708-019B960494DF}">
-                <a14:hiddenLine xmlns:a14="http://schemas.microsoft.com/office/drawing/2010/main" xmlns:p14="http://schemas.microsoft.com/office/powerpoint/2010/main" xmlns:a16="http://schemas.microsoft.com/office/drawing/2014/main" xmlns="" w="9525">
+                <a14:hiddenLine xmlns="" xmlns:a16="http://schemas.microsoft.com/office/drawing/2014/main" xmlns:p14="http://schemas.microsoft.com/office/powerpoint/2010/main" xmlns:a14="http://schemas.microsoft.com/office/drawing/2010/main" w="9525">
                   <a:solidFill>
                     <a:srgbClr val="000000"/>
                   </a:solidFill>
@@ -13168,7 +13168,7 @@
             </a:ln>
             <a:extLst>
               <a:ext uri="{91240B29-F687-4f45-9708-019B960494DF}">
-                <a14:hiddenLine xmlns:a14="http://schemas.microsoft.com/office/drawing/2010/main" xmlns:p14="http://schemas.microsoft.com/office/powerpoint/2010/main" xmlns:a16="http://schemas.microsoft.com/office/drawing/2014/main" xmlns="" w="9525">
+                <a14:hiddenLine xmlns="" xmlns:a16="http://schemas.microsoft.com/office/drawing/2014/main" xmlns:p14="http://schemas.microsoft.com/office/powerpoint/2010/main" xmlns:a14="http://schemas.microsoft.com/office/drawing/2010/main" w="9525">
                   <a:solidFill>
                     <a:srgbClr val="000000"/>
                   </a:solidFill>
@@ -13242,7 +13242,7 @@
             </a:ln>
             <a:extLst>
               <a:ext uri="{91240B29-F687-4f45-9708-019B960494DF}">
-                <a14:hiddenLine xmlns:a14="http://schemas.microsoft.com/office/drawing/2010/main" xmlns:p14="http://schemas.microsoft.com/office/powerpoint/2010/main" xmlns:a16="http://schemas.microsoft.com/office/drawing/2014/main" xmlns="" w="9525">
+                <a14:hiddenLine xmlns="" xmlns:a16="http://schemas.microsoft.com/office/drawing/2014/main" xmlns:p14="http://schemas.microsoft.com/office/powerpoint/2010/main" xmlns:a14="http://schemas.microsoft.com/office/drawing/2010/main" w="9525">
                   <a:solidFill>
                     <a:srgbClr val="000000"/>
                   </a:solidFill>
@@ -13316,7 +13316,7 @@
             </a:ln>
             <a:extLst>
               <a:ext uri="{91240B29-F687-4f45-9708-019B960494DF}">
-                <a14:hiddenLine xmlns:a14="http://schemas.microsoft.com/office/drawing/2010/main" xmlns:p14="http://schemas.microsoft.com/office/powerpoint/2010/main" xmlns:a16="http://schemas.microsoft.com/office/drawing/2014/main" xmlns="" w="9525">
+                <a14:hiddenLine xmlns="" xmlns:a16="http://schemas.microsoft.com/office/drawing/2014/main" xmlns:p14="http://schemas.microsoft.com/office/powerpoint/2010/main" xmlns:a14="http://schemas.microsoft.com/office/drawing/2010/main" w="9525">
                   <a:solidFill>
                     <a:srgbClr val="000000"/>
                   </a:solidFill>
@@ -13418,7 +13418,7 @@
             </a:ln>
             <a:extLst>
               <a:ext uri="{91240B29-F687-4f45-9708-019B960494DF}">
-                <a14:hiddenLine xmlns:a14="http://schemas.microsoft.com/office/drawing/2010/main" xmlns:p14="http://schemas.microsoft.com/office/powerpoint/2010/main" xmlns:a16="http://schemas.microsoft.com/office/drawing/2014/main" xmlns="" w="9525">
+                <a14:hiddenLine xmlns="" xmlns:a16="http://schemas.microsoft.com/office/drawing/2014/main" xmlns:p14="http://schemas.microsoft.com/office/powerpoint/2010/main" xmlns:a14="http://schemas.microsoft.com/office/drawing/2010/main" w="9525">
                   <a:solidFill>
                     <a:srgbClr val="000000"/>
                   </a:solidFill>
@@ -13520,7 +13520,7 @@
             </a:ln>
             <a:extLst>
               <a:ext uri="{91240B29-F687-4f45-9708-019B960494DF}">
-                <a14:hiddenLine xmlns:a14="http://schemas.microsoft.com/office/drawing/2010/main" xmlns:p14="http://schemas.microsoft.com/office/powerpoint/2010/main" xmlns:a16="http://schemas.microsoft.com/office/drawing/2014/main" xmlns="" w="9525">
+                <a14:hiddenLine xmlns="" xmlns:a16="http://schemas.microsoft.com/office/drawing/2014/main" xmlns:p14="http://schemas.microsoft.com/office/powerpoint/2010/main" xmlns:a14="http://schemas.microsoft.com/office/drawing/2010/main" w="9525">
                   <a:solidFill>
                     <a:srgbClr val="000000"/>
                   </a:solidFill>
@@ -13594,7 +13594,7 @@
             </a:ln>
             <a:extLst>
               <a:ext uri="{91240B29-F687-4f45-9708-019B960494DF}">
-                <a14:hiddenLine xmlns:a14="http://schemas.microsoft.com/office/drawing/2010/main" xmlns:p14="http://schemas.microsoft.com/office/powerpoint/2010/main" xmlns:a16="http://schemas.microsoft.com/office/drawing/2014/main" xmlns="" w="9525">
+                <a14:hiddenLine xmlns="" xmlns:a16="http://schemas.microsoft.com/office/drawing/2014/main" xmlns:p14="http://schemas.microsoft.com/office/powerpoint/2010/main" xmlns:a14="http://schemas.microsoft.com/office/drawing/2010/main" w="9525">
                   <a:solidFill>
                     <a:srgbClr val="000000"/>
                   </a:solidFill>
@@ -13716,7 +13716,7 @@
             </a:ln>
             <a:extLst>
               <a:ext uri="{91240B29-F687-4f45-9708-019B960494DF}">
-                <a14:hiddenLine xmlns:a14="http://schemas.microsoft.com/office/drawing/2010/main" xmlns:p14="http://schemas.microsoft.com/office/powerpoint/2010/main" xmlns:a16="http://schemas.microsoft.com/office/drawing/2014/main" xmlns="" w="9525">
+                <a14:hiddenLine xmlns="" xmlns:a16="http://schemas.microsoft.com/office/drawing/2014/main" xmlns:p14="http://schemas.microsoft.com/office/powerpoint/2010/main" xmlns:a14="http://schemas.microsoft.com/office/drawing/2010/main" w="9525">
                   <a:solidFill>
                     <a:srgbClr val="000000"/>
                   </a:solidFill>
@@ -13824,7 +13824,7 @@
             </a:ln>
             <a:extLst>
               <a:ext uri="{91240B29-F687-4f45-9708-019B960494DF}">
-                <a14:hiddenLine xmlns:a14="http://schemas.microsoft.com/office/drawing/2010/main" xmlns:p14="http://schemas.microsoft.com/office/powerpoint/2010/main" xmlns:a16="http://schemas.microsoft.com/office/drawing/2014/main" xmlns="" w="9525">
+                <a14:hiddenLine xmlns="" xmlns:a16="http://schemas.microsoft.com/office/drawing/2014/main" xmlns:p14="http://schemas.microsoft.com/office/powerpoint/2010/main" xmlns:a14="http://schemas.microsoft.com/office/drawing/2010/main" w="9525">
                   <a:solidFill>
                     <a:srgbClr val="000000"/>
                   </a:solidFill>
@@ -13898,7 +13898,7 @@
             </a:ln>
             <a:extLst>
               <a:ext uri="{91240B29-F687-4f45-9708-019B960494DF}">
-                <a14:hiddenLine xmlns:a14="http://schemas.microsoft.com/office/drawing/2010/main" xmlns:p14="http://schemas.microsoft.com/office/powerpoint/2010/main" xmlns:a16="http://schemas.microsoft.com/office/drawing/2014/main" xmlns="" w="9525">
+                <a14:hiddenLine xmlns="" xmlns:a16="http://schemas.microsoft.com/office/drawing/2014/main" xmlns:p14="http://schemas.microsoft.com/office/powerpoint/2010/main" xmlns:a14="http://schemas.microsoft.com/office/drawing/2010/main" w="9525">
                   <a:solidFill>
                     <a:srgbClr val="000000"/>
                   </a:solidFill>
@@ -13972,7 +13972,7 @@
             </a:ln>
             <a:extLst>
               <a:ext uri="{91240B29-F687-4f45-9708-019B960494DF}">
-                <a14:hiddenLine xmlns:a14="http://schemas.microsoft.com/office/drawing/2010/main" xmlns:p14="http://schemas.microsoft.com/office/powerpoint/2010/main" xmlns:a16="http://schemas.microsoft.com/office/drawing/2014/main" xmlns="" w="9525">
+                <a14:hiddenLine xmlns="" xmlns:a16="http://schemas.microsoft.com/office/drawing/2014/main" xmlns:p14="http://schemas.microsoft.com/office/powerpoint/2010/main" xmlns:a14="http://schemas.microsoft.com/office/drawing/2010/main" w="9525">
                   <a:solidFill>
                     <a:srgbClr val="000000"/>
                   </a:solidFill>
@@ -14074,7 +14074,7 @@
             </a:ln>
             <a:extLst>
               <a:ext uri="{91240B29-F687-4f45-9708-019B960494DF}">
-                <a14:hiddenLine xmlns:a14="http://schemas.microsoft.com/office/drawing/2010/main" xmlns:p14="http://schemas.microsoft.com/office/powerpoint/2010/main" xmlns:a16="http://schemas.microsoft.com/office/drawing/2014/main" xmlns="" w="9525">
+                <a14:hiddenLine xmlns="" xmlns:a16="http://schemas.microsoft.com/office/drawing/2014/main" xmlns:p14="http://schemas.microsoft.com/office/powerpoint/2010/main" xmlns:a14="http://schemas.microsoft.com/office/drawing/2010/main" w="9525">
                   <a:solidFill>
                     <a:srgbClr val="000000"/>
                   </a:solidFill>
@@ -14120,7 +14120,7 @@
             </a:ln>
             <a:extLst>
               <a:ext uri="{91240B29-F687-4f45-9708-019B960494DF}">
-                <a14:hiddenLine xmlns:a14="http://schemas.microsoft.com/office/drawing/2010/main" xmlns:p14="http://schemas.microsoft.com/office/powerpoint/2010/main" xmlns:a16="http://schemas.microsoft.com/office/drawing/2014/main" xmlns="" w="9525">
+                <a14:hiddenLine xmlns="" xmlns:a16="http://schemas.microsoft.com/office/drawing/2014/main" xmlns:p14="http://schemas.microsoft.com/office/powerpoint/2010/main" xmlns:a14="http://schemas.microsoft.com/office/drawing/2010/main" w="9525">
                   <a:solidFill>
                     <a:srgbClr val="000000"/>
                   </a:solidFill>
@@ -14197,7 +14197,7 @@
             </a:ln>
             <a:extLst>
               <a:ext uri="{91240B29-F687-4f45-9708-019B960494DF}">
-                <a14:hiddenLine xmlns:a14="http://schemas.microsoft.com/office/drawing/2010/main" xmlns:p14="http://schemas.microsoft.com/office/powerpoint/2010/main" xmlns:a16="http://schemas.microsoft.com/office/drawing/2014/main" xmlns="" w="9525">
+                <a14:hiddenLine xmlns="" xmlns:a16="http://schemas.microsoft.com/office/drawing/2014/main" xmlns:p14="http://schemas.microsoft.com/office/powerpoint/2010/main" xmlns:a14="http://schemas.microsoft.com/office/drawing/2010/main" w="9525">
                   <a:solidFill>
                     <a:srgbClr val="000000"/>
                   </a:solidFill>
@@ -14299,7 +14299,7 @@
             </a:ln>
             <a:extLst>
               <a:ext uri="{91240B29-F687-4f45-9708-019B960494DF}">
-                <a14:hiddenLine xmlns:a14="http://schemas.microsoft.com/office/drawing/2010/main" xmlns:p14="http://schemas.microsoft.com/office/powerpoint/2010/main" xmlns:a16="http://schemas.microsoft.com/office/drawing/2014/main" xmlns="" w="9525">
+                <a14:hiddenLine xmlns="" xmlns:a16="http://schemas.microsoft.com/office/drawing/2014/main" xmlns:p14="http://schemas.microsoft.com/office/powerpoint/2010/main" xmlns:a14="http://schemas.microsoft.com/office/drawing/2010/main" w="9525">
                   <a:solidFill>
                     <a:srgbClr val="000000"/>
                   </a:solidFill>
@@ -14373,7 +14373,7 @@
             </a:ln>
             <a:extLst>
               <a:ext uri="{91240B29-F687-4f45-9708-019B960494DF}">
-                <a14:hiddenLine xmlns:a14="http://schemas.microsoft.com/office/drawing/2010/main" xmlns:p14="http://schemas.microsoft.com/office/powerpoint/2010/main" xmlns:a16="http://schemas.microsoft.com/office/drawing/2014/main" xmlns="" w="9525">
+                <a14:hiddenLine xmlns="" xmlns:a16="http://schemas.microsoft.com/office/drawing/2014/main" xmlns:p14="http://schemas.microsoft.com/office/powerpoint/2010/main" xmlns:a14="http://schemas.microsoft.com/office/drawing/2010/main" w="9525">
                   <a:solidFill>
                     <a:srgbClr val="000000"/>
                   </a:solidFill>
@@ -14475,7 +14475,7 @@
             </a:ln>
             <a:extLst>
               <a:ext uri="{91240B29-F687-4f45-9708-019B960494DF}">
-                <a14:hiddenLine xmlns:a14="http://schemas.microsoft.com/office/drawing/2010/main" xmlns:p14="http://schemas.microsoft.com/office/powerpoint/2010/main" xmlns:a16="http://schemas.microsoft.com/office/drawing/2014/main" xmlns="" w="9525">
+                <a14:hiddenLine xmlns="" xmlns:a16="http://schemas.microsoft.com/office/drawing/2014/main" xmlns:p14="http://schemas.microsoft.com/office/powerpoint/2010/main" xmlns:a14="http://schemas.microsoft.com/office/drawing/2010/main" w="9525">
                   <a:solidFill>
                     <a:srgbClr val="000000"/>
                   </a:solidFill>
@@ -14552,7 +14552,7 @@
             </a:ln>
             <a:extLst>
               <a:ext uri="{91240B29-F687-4f45-9708-019B960494DF}">
-                <a14:hiddenLine xmlns:a14="http://schemas.microsoft.com/office/drawing/2010/main" xmlns:p14="http://schemas.microsoft.com/office/powerpoint/2010/main" xmlns:a16="http://schemas.microsoft.com/office/drawing/2014/main" xmlns="" w="9525">
+                <a14:hiddenLine xmlns="" xmlns:a16="http://schemas.microsoft.com/office/drawing/2014/main" xmlns:p14="http://schemas.microsoft.com/office/powerpoint/2010/main" xmlns:a14="http://schemas.microsoft.com/office/drawing/2010/main" w="9525">
                   <a:solidFill>
                     <a:srgbClr val="000000"/>
                   </a:solidFill>
@@ -14626,7 +14626,7 @@
             </a:ln>
             <a:extLst>
               <a:ext uri="{91240B29-F687-4f45-9708-019B960494DF}">
-                <a14:hiddenLine xmlns:a14="http://schemas.microsoft.com/office/drawing/2010/main" xmlns:p14="http://schemas.microsoft.com/office/powerpoint/2010/main" xmlns:a16="http://schemas.microsoft.com/office/drawing/2014/main" xmlns="" w="9525">
+                <a14:hiddenLine xmlns="" xmlns:a16="http://schemas.microsoft.com/office/drawing/2014/main" xmlns:p14="http://schemas.microsoft.com/office/powerpoint/2010/main" xmlns:a14="http://schemas.microsoft.com/office/drawing/2010/main" w="9525">
                   <a:solidFill>
                     <a:srgbClr val="000000"/>
                   </a:solidFill>
@@ -14728,7 +14728,7 @@
             </a:ln>
             <a:extLst>
               <a:ext uri="{91240B29-F687-4f45-9708-019B960494DF}">
-                <a14:hiddenLine xmlns:a14="http://schemas.microsoft.com/office/drawing/2010/main" xmlns:p14="http://schemas.microsoft.com/office/powerpoint/2010/main" xmlns:a16="http://schemas.microsoft.com/office/drawing/2014/main" xmlns="" w="9525">
+                <a14:hiddenLine xmlns="" xmlns:a16="http://schemas.microsoft.com/office/drawing/2014/main" xmlns:p14="http://schemas.microsoft.com/office/powerpoint/2010/main" xmlns:a14="http://schemas.microsoft.com/office/drawing/2010/main" w="9525">
                   <a:solidFill>
                     <a:srgbClr val="000000"/>
                   </a:solidFill>
@@ -14830,7 +14830,7 @@
             </a:ln>
             <a:extLst>
               <a:ext uri="{91240B29-F687-4f45-9708-019B960494DF}">
-                <a14:hiddenLine xmlns:a14="http://schemas.microsoft.com/office/drawing/2010/main" xmlns:p14="http://schemas.microsoft.com/office/powerpoint/2010/main" xmlns:a16="http://schemas.microsoft.com/office/drawing/2014/main" xmlns="" w="9525">
+                <a14:hiddenLine xmlns="" xmlns:a16="http://schemas.microsoft.com/office/drawing/2014/main" xmlns:p14="http://schemas.microsoft.com/office/powerpoint/2010/main" xmlns:a14="http://schemas.microsoft.com/office/drawing/2010/main" w="9525">
                   <a:solidFill>
                     <a:srgbClr val="000000"/>
                   </a:solidFill>
@@ -14907,7 +14907,7 @@
             </a:ln>
             <a:extLst>
               <a:ext uri="{91240B29-F687-4f45-9708-019B960494DF}">
-                <a14:hiddenLine xmlns:a14="http://schemas.microsoft.com/office/drawing/2010/main" xmlns:p14="http://schemas.microsoft.com/office/powerpoint/2010/main" xmlns:a16="http://schemas.microsoft.com/office/drawing/2014/main" xmlns="" w="9525">
+                <a14:hiddenLine xmlns="" xmlns:a16="http://schemas.microsoft.com/office/drawing/2014/main" xmlns:p14="http://schemas.microsoft.com/office/powerpoint/2010/main" xmlns:a14="http://schemas.microsoft.com/office/drawing/2010/main" w="9525">
                   <a:solidFill>
                     <a:srgbClr val="000000"/>
                   </a:solidFill>
@@ -15039,7 +15039,7 @@
             </a:ln>
             <a:extLst>
               <a:ext uri="{91240B29-F687-4f45-9708-019B960494DF}">
-                <a14:hiddenLine xmlns:a14="http://schemas.microsoft.com/office/drawing/2010/main" xmlns:p14="http://schemas.microsoft.com/office/powerpoint/2010/main" xmlns:a16="http://schemas.microsoft.com/office/drawing/2014/main" xmlns="" w="9525">
+                <a14:hiddenLine xmlns="" xmlns:a16="http://schemas.microsoft.com/office/drawing/2014/main" xmlns:p14="http://schemas.microsoft.com/office/powerpoint/2010/main" xmlns:a14="http://schemas.microsoft.com/office/drawing/2010/main" w="9525">
                   <a:solidFill>
                     <a:srgbClr val="000000"/>
                   </a:solidFill>
@@ -15315,7 +15315,7 @@
             </a:ln>
             <a:extLst>
               <a:ext uri="{91240B29-F687-4f45-9708-019B960494DF}">
-                <a14:hiddenLine xmlns="" xmlns:a16="http://schemas.microsoft.com/office/drawing/2014/main" xmlns:p14="http://schemas.microsoft.com/office/powerpoint/2010/main" xmlns:a14="http://schemas.microsoft.com/office/drawing/2010/main" w="9525">
+                <a14:hiddenLine xmlns:a14="http://schemas.microsoft.com/office/drawing/2010/main" xmlns:p14="http://schemas.microsoft.com/office/powerpoint/2010/main" xmlns:a16="http://schemas.microsoft.com/office/drawing/2014/main" xmlns="" w="9525">
                   <a:solidFill>
                     <a:srgbClr val="000000"/>
                   </a:solidFill>
@@ -15417,7 +15417,7 @@
             </a:ln>
             <a:extLst>
               <a:ext uri="{91240B29-F687-4f45-9708-019B960494DF}">
-                <a14:hiddenLine xmlns="" xmlns:a16="http://schemas.microsoft.com/office/drawing/2014/main" xmlns:p14="http://schemas.microsoft.com/office/powerpoint/2010/main" xmlns:a14="http://schemas.microsoft.com/office/drawing/2010/main" w="9525">
+                <a14:hiddenLine xmlns:a14="http://schemas.microsoft.com/office/drawing/2010/main" xmlns:p14="http://schemas.microsoft.com/office/powerpoint/2010/main" xmlns:a16="http://schemas.microsoft.com/office/drawing/2014/main" xmlns="" w="9525">
                   <a:solidFill>
                     <a:srgbClr val="000000"/>
                   </a:solidFill>
@@ -15519,7 +15519,7 @@
             </a:ln>
             <a:extLst>
               <a:ext uri="{91240B29-F687-4f45-9708-019B960494DF}">
-                <a14:hiddenLine xmlns="" xmlns:a16="http://schemas.microsoft.com/office/drawing/2014/main" xmlns:p14="http://schemas.microsoft.com/office/powerpoint/2010/main" xmlns:a14="http://schemas.microsoft.com/office/drawing/2010/main" w="9525">
+                <a14:hiddenLine xmlns:a14="http://schemas.microsoft.com/office/drawing/2010/main" xmlns:p14="http://schemas.microsoft.com/office/powerpoint/2010/main" xmlns:a16="http://schemas.microsoft.com/office/drawing/2014/main" xmlns="" w="9525">
                   <a:solidFill>
                     <a:srgbClr val="000000"/>
                   </a:solidFill>
@@ -15593,7 +15593,7 @@
             </a:ln>
             <a:extLst>
               <a:ext uri="{91240B29-F687-4f45-9708-019B960494DF}">
-                <a14:hiddenLine xmlns="" xmlns:a16="http://schemas.microsoft.com/office/drawing/2014/main" xmlns:p14="http://schemas.microsoft.com/office/powerpoint/2010/main" xmlns:a14="http://schemas.microsoft.com/office/drawing/2010/main" w="9525">
+                <a14:hiddenLine xmlns:a14="http://schemas.microsoft.com/office/drawing/2010/main" xmlns:p14="http://schemas.microsoft.com/office/powerpoint/2010/main" xmlns:a16="http://schemas.microsoft.com/office/drawing/2014/main" xmlns="" w="9525">
                   <a:solidFill>
                     <a:srgbClr val="000000"/>
                   </a:solidFill>
@@ -15695,7 +15695,7 @@
             </a:ln>
             <a:extLst>
               <a:ext uri="{91240B29-F687-4f45-9708-019B960494DF}">
-                <a14:hiddenLine xmlns="" xmlns:a16="http://schemas.microsoft.com/office/drawing/2014/main" xmlns:p14="http://schemas.microsoft.com/office/powerpoint/2010/main" xmlns:a14="http://schemas.microsoft.com/office/drawing/2010/main" w="9525">
+                <a14:hiddenLine xmlns:a14="http://schemas.microsoft.com/office/drawing/2010/main" xmlns:p14="http://schemas.microsoft.com/office/powerpoint/2010/main" xmlns:a16="http://schemas.microsoft.com/office/drawing/2014/main" xmlns="" w="9525">
                   <a:solidFill>
                     <a:srgbClr val="000000"/>
                   </a:solidFill>
@@ -15769,7 +15769,7 @@
             </a:ln>
             <a:extLst>
               <a:ext uri="{91240B29-F687-4f45-9708-019B960494DF}">
-                <a14:hiddenLine xmlns="" xmlns:a16="http://schemas.microsoft.com/office/drawing/2014/main" xmlns:p14="http://schemas.microsoft.com/office/powerpoint/2010/main" xmlns:a14="http://schemas.microsoft.com/office/drawing/2010/main" w="9525">
+                <a14:hiddenLine xmlns:a14="http://schemas.microsoft.com/office/drawing/2010/main" xmlns:p14="http://schemas.microsoft.com/office/powerpoint/2010/main" xmlns:a16="http://schemas.microsoft.com/office/drawing/2014/main" xmlns="" w="9525">
                   <a:solidFill>
                     <a:srgbClr val="000000"/>
                   </a:solidFill>
@@ -15843,7 +15843,7 @@
             </a:ln>
             <a:extLst>
               <a:ext uri="{91240B29-F687-4f45-9708-019B960494DF}">
-                <a14:hiddenLine xmlns="" xmlns:a16="http://schemas.microsoft.com/office/drawing/2014/main" xmlns:p14="http://schemas.microsoft.com/office/powerpoint/2010/main" xmlns:a14="http://schemas.microsoft.com/office/drawing/2010/main" w="9525">
+                <a14:hiddenLine xmlns:a14="http://schemas.microsoft.com/office/drawing/2010/main" xmlns:p14="http://schemas.microsoft.com/office/powerpoint/2010/main" xmlns:a16="http://schemas.microsoft.com/office/drawing/2014/main" xmlns="" w="9525">
                   <a:solidFill>
                     <a:srgbClr val="000000"/>
                   </a:solidFill>
@@ -15945,7 +15945,7 @@
             </a:ln>
             <a:extLst>
               <a:ext uri="{91240B29-F687-4f45-9708-019B960494DF}">
-                <a14:hiddenLine xmlns="" xmlns:a16="http://schemas.microsoft.com/office/drawing/2014/main" xmlns:p14="http://schemas.microsoft.com/office/powerpoint/2010/main" xmlns:a14="http://schemas.microsoft.com/office/drawing/2010/main" w="9525">
+                <a14:hiddenLine xmlns:a14="http://schemas.microsoft.com/office/drawing/2010/main" xmlns:p14="http://schemas.microsoft.com/office/powerpoint/2010/main" xmlns:a16="http://schemas.microsoft.com/office/drawing/2014/main" xmlns="" w="9525">
                   <a:solidFill>
                     <a:srgbClr val="000000"/>
                   </a:solidFill>
@@ -16047,7 +16047,7 @@
             </a:ln>
             <a:extLst>
               <a:ext uri="{91240B29-F687-4f45-9708-019B960494DF}">
-                <a14:hiddenLine xmlns="" xmlns:a16="http://schemas.microsoft.com/office/drawing/2014/main" xmlns:p14="http://schemas.microsoft.com/office/powerpoint/2010/main" xmlns:a14="http://schemas.microsoft.com/office/drawing/2010/main" w="9525">
+                <a14:hiddenLine xmlns:a14="http://schemas.microsoft.com/office/drawing/2010/main" xmlns:p14="http://schemas.microsoft.com/office/powerpoint/2010/main" xmlns:a16="http://schemas.microsoft.com/office/drawing/2014/main" xmlns="" w="9525">
                   <a:solidFill>
                     <a:srgbClr val="000000"/>
                   </a:solidFill>
@@ -16121,7 +16121,7 @@
             </a:ln>
             <a:extLst>
               <a:ext uri="{91240B29-F687-4f45-9708-019B960494DF}">
-                <a14:hiddenLine xmlns="" xmlns:a16="http://schemas.microsoft.com/office/drawing/2014/main" xmlns:p14="http://schemas.microsoft.com/office/powerpoint/2010/main" xmlns:a14="http://schemas.microsoft.com/office/drawing/2010/main" w="9525">
+                <a14:hiddenLine xmlns:a14="http://schemas.microsoft.com/office/drawing/2010/main" xmlns:p14="http://schemas.microsoft.com/office/powerpoint/2010/main" xmlns:a16="http://schemas.microsoft.com/office/drawing/2014/main" xmlns="" w="9525">
                   <a:solidFill>
                     <a:srgbClr val="000000"/>
                   </a:solidFill>
@@ -16243,7 +16243,7 @@
             </a:ln>
             <a:extLst>
               <a:ext uri="{91240B29-F687-4f45-9708-019B960494DF}">
-                <a14:hiddenLine xmlns="" xmlns:a16="http://schemas.microsoft.com/office/drawing/2014/main" xmlns:p14="http://schemas.microsoft.com/office/powerpoint/2010/main" xmlns:a14="http://schemas.microsoft.com/office/drawing/2010/main" w="9525">
+                <a14:hiddenLine xmlns:a14="http://schemas.microsoft.com/office/drawing/2010/main" xmlns:p14="http://schemas.microsoft.com/office/powerpoint/2010/main" xmlns:a16="http://schemas.microsoft.com/office/drawing/2014/main" xmlns="" w="9525">
                   <a:solidFill>
                     <a:srgbClr val="000000"/>
                   </a:solidFill>
@@ -16351,7 +16351,7 @@
             </a:ln>
             <a:extLst>
               <a:ext uri="{91240B29-F687-4f45-9708-019B960494DF}">
-                <a14:hiddenLine xmlns="" xmlns:a16="http://schemas.microsoft.com/office/drawing/2014/main" xmlns:p14="http://schemas.microsoft.com/office/powerpoint/2010/main" xmlns:a14="http://schemas.microsoft.com/office/drawing/2010/main" w="9525">
+                <a14:hiddenLine xmlns:a14="http://schemas.microsoft.com/office/drawing/2010/main" xmlns:p14="http://schemas.microsoft.com/office/powerpoint/2010/main" xmlns:a16="http://schemas.microsoft.com/office/drawing/2014/main" xmlns="" w="9525">
                   <a:solidFill>
                     <a:srgbClr val="000000"/>
                   </a:solidFill>
@@ -16425,7 +16425,7 @@
             </a:ln>
             <a:extLst>
               <a:ext uri="{91240B29-F687-4f45-9708-019B960494DF}">
-                <a14:hiddenLine xmlns="" xmlns:a16="http://schemas.microsoft.com/office/drawing/2014/main" xmlns:p14="http://schemas.microsoft.com/office/powerpoint/2010/main" xmlns:a14="http://schemas.microsoft.com/office/drawing/2010/main" w="9525">
+                <a14:hiddenLine xmlns:a14="http://schemas.microsoft.com/office/drawing/2010/main" xmlns:p14="http://schemas.microsoft.com/office/powerpoint/2010/main" xmlns:a16="http://schemas.microsoft.com/office/drawing/2014/main" xmlns="" w="9525">
                   <a:solidFill>
                     <a:srgbClr val="000000"/>
                   </a:solidFill>
@@ -16499,7 +16499,7 @@
             </a:ln>
             <a:extLst>
               <a:ext uri="{91240B29-F687-4f45-9708-019B960494DF}">
-                <a14:hiddenLine xmlns="" xmlns:a16="http://schemas.microsoft.com/office/drawing/2014/main" xmlns:p14="http://schemas.microsoft.com/office/powerpoint/2010/main" xmlns:a14="http://schemas.microsoft.com/office/drawing/2010/main" w="9525">
+                <a14:hiddenLine xmlns:a14="http://schemas.microsoft.com/office/drawing/2010/main" xmlns:p14="http://schemas.microsoft.com/office/powerpoint/2010/main" xmlns:a16="http://schemas.microsoft.com/office/drawing/2014/main" xmlns="" w="9525">
                   <a:solidFill>
                     <a:srgbClr val="000000"/>
                   </a:solidFill>
@@ -16601,7 +16601,7 @@
             </a:ln>
             <a:extLst>
               <a:ext uri="{91240B29-F687-4f45-9708-019B960494DF}">
-                <a14:hiddenLine xmlns="" xmlns:a16="http://schemas.microsoft.com/office/drawing/2014/main" xmlns:p14="http://schemas.microsoft.com/office/powerpoint/2010/main" xmlns:a14="http://schemas.microsoft.com/office/drawing/2010/main" w="9525">
+                <a14:hiddenLine xmlns:a14="http://schemas.microsoft.com/office/drawing/2010/main" xmlns:p14="http://schemas.microsoft.com/office/powerpoint/2010/main" xmlns:a16="http://schemas.microsoft.com/office/drawing/2014/main" xmlns="" w="9525">
                   <a:solidFill>
                     <a:srgbClr val="000000"/>
                   </a:solidFill>
@@ -16647,7 +16647,7 @@
             </a:ln>
             <a:extLst>
               <a:ext uri="{91240B29-F687-4f45-9708-019B960494DF}">
-                <a14:hiddenLine xmlns="" xmlns:a16="http://schemas.microsoft.com/office/drawing/2014/main" xmlns:p14="http://schemas.microsoft.com/office/powerpoint/2010/main" xmlns:a14="http://schemas.microsoft.com/office/drawing/2010/main" w="9525">
+                <a14:hiddenLine xmlns:a14="http://schemas.microsoft.com/office/drawing/2010/main" xmlns:p14="http://schemas.microsoft.com/office/powerpoint/2010/main" xmlns:a16="http://schemas.microsoft.com/office/drawing/2014/main" xmlns="" w="9525">
                   <a:solidFill>
                     <a:srgbClr val="000000"/>
                   </a:solidFill>
@@ -16724,7 +16724,7 @@
             </a:ln>
             <a:extLst>
               <a:ext uri="{91240B29-F687-4f45-9708-019B960494DF}">
-                <a14:hiddenLine xmlns="" xmlns:a16="http://schemas.microsoft.com/office/drawing/2014/main" xmlns:p14="http://schemas.microsoft.com/office/powerpoint/2010/main" xmlns:a14="http://schemas.microsoft.com/office/drawing/2010/main" w="9525">
+                <a14:hiddenLine xmlns:a14="http://schemas.microsoft.com/office/drawing/2010/main" xmlns:p14="http://schemas.microsoft.com/office/powerpoint/2010/main" xmlns:a16="http://schemas.microsoft.com/office/drawing/2014/main" xmlns="" w="9525">
                   <a:solidFill>
                     <a:srgbClr val="000000"/>
                   </a:solidFill>
@@ -16826,7 +16826,7 @@
             </a:ln>
             <a:extLst>
               <a:ext uri="{91240B29-F687-4f45-9708-019B960494DF}">
-                <a14:hiddenLine xmlns="" xmlns:a16="http://schemas.microsoft.com/office/drawing/2014/main" xmlns:p14="http://schemas.microsoft.com/office/powerpoint/2010/main" xmlns:a14="http://schemas.microsoft.com/office/drawing/2010/main" w="9525">
+                <a14:hiddenLine xmlns:a14="http://schemas.microsoft.com/office/drawing/2010/main" xmlns:p14="http://schemas.microsoft.com/office/powerpoint/2010/main" xmlns:a16="http://schemas.microsoft.com/office/drawing/2014/main" xmlns="" w="9525">
                   <a:solidFill>
                     <a:srgbClr val="000000"/>
                   </a:solidFill>
@@ -16900,7 +16900,7 @@
             </a:ln>
             <a:extLst>
               <a:ext uri="{91240B29-F687-4f45-9708-019B960494DF}">
-                <a14:hiddenLine xmlns="" xmlns:a16="http://schemas.microsoft.com/office/drawing/2014/main" xmlns:p14="http://schemas.microsoft.com/office/powerpoint/2010/main" xmlns:a14="http://schemas.microsoft.com/office/drawing/2010/main" w="9525">
+                <a14:hiddenLine xmlns:a14="http://schemas.microsoft.com/office/drawing/2010/main" xmlns:p14="http://schemas.microsoft.com/office/powerpoint/2010/main" xmlns:a16="http://schemas.microsoft.com/office/drawing/2014/main" xmlns="" w="9525">
                   <a:solidFill>
                     <a:srgbClr val="000000"/>
                   </a:solidFill>
@@ -17002,7 +17002,7 @@
             </a:ln>
             <a:extLst>
               <a:ext uri="{91240B29-F687-4f45-9708-019B960494DF}">
-                <a14:hiddenLine xmlns="" xmlns:a16="http://schemas.microsoft.com/office/drawing/2014/main" xmlns:p14="http://schemas.microsoft.com/office/powerpoint/2010/main" xmlns:a14="http://schemas.microsoft.com/office/drawing/2010/main" w="9525">
+                <a14:hiddenLine xmlns:a14="http://schemas.microsoft.com/office/drawing/2010/main" xmlns:p14="http://schemas.microsoft.com/office/powerpoint/2010/main" xmlns:a16="http://schemas.microsoft.com/office/drawing/2014/main" xmlns="" w="9525">
                   <a:solidFill>
                     <a:srgbClr val="000000"/>
                   </a:solidFill>
@@ -17079,7 +17079,7 @@
             </a:ln>
             <a:extLst>
               <a:ext uri="{91240B29-F687-4f45-9708-019B960494DF}">
-                <a14:hiddenLine xmlns="" xmlns:a16="http://schemas.microsoft.com/office/drawing/2014/main" xmlns:p14="http://schemas.microsoft.com/office/powerpoint/2010/main" xmlns:a14="http://schemas.microsoft.com/office/drawing/2010/main" w="9525">
+                <a14:hiddenLine xmlns:a14="http://schemas.microsoft.com/office/drawing/2010/main" xmlns:p14="http://schemas.microsoft.com/office/powerpoint/2010/main" xmlns:a16="http://schemas.microsoft.com/office/drawing/2014/main" xmlns="" w="9525">
                   <a:solidFill>
                     <a:srgbClr val="000000"/>
                   </a:solidFill>
@@ -17153,7 +17153,7 @@
             </a:ln>
             <a:extLst>
               <a:ext uri="{91240B29-F687-4f45-9708-019B960494DF}">
-                <a14:hiddenLine xmlns="" xmlns:a16="http://schemas.microsoft.com/office/drawing/2014/main" xmlns:p14="http://schemas.microsoft.com/office/powerpoint/2010/main" xmlns:a14="http://schemas.microsoft.com/office/drawing/2010/main" w="9525">
+                <a14:hiddenLine xmlns:a14="http://schemas.microsoft.com/office/drawing/2010/main" xmlns:p14="http://schemas.microsoft.com/office/powerpoint/2010/main" xmlns:a16="http://schemas.microsoft.com/office/drawing/2014/main" xmlns="" w="9525">
                   <a:solidFill>
                     <a:srgbClr val="000000"/>
                   </a:solidFill>
@@ -17255,7 +17255,7 @@
             </a:ln>
             <a:extLst>
               <a:ext uri="{91240B29-F687-4f45-9708-019B960494DF}">
-                <a14:hiddenLine xmlns="" xmlns:a16="http://schemas.microsoft.com/office/drawing/2014/main" xmlns:p14="http://schemas.microsoft.com/office/powerpoint/2010/main" xmlns:a14="http://schemas.microsoft.com/office/drawing/2010/main" w="9525">
+                <a14:hiddenLine xmlns:a14="http://schemas.microsoft.com/office/drawing/2010/main" xmlns:p14="http://schemas.microsoft.com/office/powerpoint/2010/main" xmlns:a16="http://schemas.microsoft.com/office/drawing/2014/main" xmlns="" w="9525">
                   <a:solidFill>
                     <a:srgbClr val="000000"/>
                   </a:solidFill>
@@ -17357,7 +17357,7 @@
             </a:ln>
             <a:extLst>
               <a:ext uri="{91240B29-F687-4f45-9708-019B960494DF}">
-                <a14:hiddenLine xmlns="" xmlns:a16="http://schemas.microsoft.com/office/drawing/2014/main" xmlns:p14="http://schemas.microsoft.com/office/powerpoint/2010/main" xmlns:a14="http://schemas.microsoft.com/office/drawing/2010/main" w="9525">
+                <a14:hiddenLine xmlns:a14="http://schemas.microsoft.com/office/drawing/2010/main" xmlns:p14="http://schemas.microsoft.com/office/powerpoint/2010/main" xmlns:a16="http://schemas.microsoft.com/office/drawing/2014/main" xmlns="" w="9525">
                   <a:solidFill>
                     <a:srgbClr val="000000"/>
                   </a:solidFill>
@@ -17434,7 +17434,7 @@
             </a:ln>
             <a:extLst>
               <a:ext uri="{91240B29-F687-4f45-9708-019B960494DF}">
-                <a14:hiddenLine xmlns="" xmlns:a16="http://schemas.microsoft.com/office/drawing/2014/main" xmlns:p14="http://schemas.microsoft.com/office/powerpoint/2010/main" xmlns:a14="http://schemas.microsoft.com/office/drawing/2010/main" w="9525">
+                <a14:hiddenLine xmlns:a14="http://schemas.microsoft.com/office/drawing/2010/main" xmlns:p14="http://schemas.microsoft.com/office/powerpoint/2010/main" xmlns:a16="http://schemas.microsoft.com/office/drawing/2014/main" xmlns="" w="9525">
                   <a:solidFill>
                     <a:srgbClr val="000000"/>
                   </a:solidFill>
@@ -17566,7 +17566,7 @@
             </a:ln>
             <a:extLst>
               <a:ext uri="{91240B29-F687-4f45-9708-019B960494DF}">
-                <a14:hiddenLine xmlns="" xmlns:a16="http://schemas.microsoft.com/office/drawing/2014/main" xmlns:p14="http://schemas.microsoft.com/office/powerpoint/2010/main" xmlns:a14="http://schemas.microsoft.com/office/drawing/2010/main" w="9525">
+                <a14:hiddenLine xmlns:a14="http://schemas.microsoft.com/office/drawing/2010/main" xmlns:p14="http://schemas.microsoft.com/office/powerpoint/2010/main" xmlns:a16="http://schemas.microsoft.com/office/drawing/2014/main" xmlns="" w="9525">
                   <a:solidFill>
                     <a:srgbClr val="000000"/>
                   </a:solidFill>
@@ -17690,7 +17690,7 @@
             </a:ln>
             <a:extLst>
               <a:ext uri="{91240B29-F687-4f45-9708-019B960494DF}">
-                <a14:hiddenLine xmlns="" xmlns:a16="http://schemas.microsoft.com/office/drawing/2014/main" xmlns:p14="http://schemas.microsoft.com/office/powerpoint/2010/main" xmlns:a14="http://schemas.microsoft.com/office/drawing/2010/main" w="9525">
+                <a14:hiddenLine xmlns:a14="http://schemas.microsoft.com/office/drawing/2010/main" xmlns:p14="http://schemas.microsoft.com/office/powerpoint/2010/main" xmlns:a16="http://schemas.microsoft.com/office/drawing/2014/main" xmlns="" w="9525">
                   <a:solidFill>
                     <a:srgbClr val="000000"/>
                   </a:solidFill>
@@ -17817,7 +17817,7 @@
             </a:ln>
             <a:extLst>
               <a:ext uri="{91240B29-F687-4f45-9708-019B960494DF}">
-                <a14:hiddenLine xmlns="" xmlns:a16="http://schemas.microsoft.com/office/drawing/2014/main" xmlns:p14="http://schemas.microsoft.com/office/powerpoint/2010/main" xmlns:a14="http://schemas.microsoft.com/office/drawing/2010/main" w="9525">
+                <a14:hiddenLine xmlns:a14="http://schemas.microsoft.com/office/drawing/2010/main" xmlns:p14="http://schemas.microsoft.com/office/powerpoint/2010/main" xmlns:a16="http://schemas.microsoft.com/office/drawing/2014/main" xmlns="" w="9525">
                   <a:solidFill>
                     <a:srgbClr val="000000"/>
                   </a:solidFill>
@@ -17919,7 +17919,7 @@
             </a:ln>
             <a:extLst>
               <a:ext uri="{91240B29-F687-4f45-9708-019B960494DF}">
-                <a14:hiddenLine xmlns="" xmlns:a16="http://schemas.microsoft.com/office/drawing/2014/main" xmlns:p14="http://schemas.microsoft.com/office/powerpoint/2010/main" xmlns:a14="http://schemas.microsoft.com/office/drawing/2010/main" w="9525">
+                <a14:hiddenLine xmlns:a14="http://schemas.microsoft.com/office/drawing/2010/main" xmlns:p14="http://schemas.microsoft.com/office/powerpoint/2010/main" xmlns:a16="http://schemas.microsoft.com/office/drawing/2014/main" xmlns="" w="9525">
                   <a:solidFill>
                     <a:srgbClr val="000000"/>
                   </a:solidFill>
@@ -17996,7 +17996,7 @@
             </a:ln>
             <a:extLst>
               <a:ext uri="{91240B29-F687-4f45-9708-019B960494DF}">
-                <a14:hiddenLine xmlns="" xmlns:a16="http://schemas.microsoft.com/office/drawing/2014/main" xmlns:p14="http://schemas.microsoft.com/office/powerpoint/2010/main" xmlns:a14="http://schemas.microsoft.com/office/drawing/2010/main" w="9525">
+                <a14:hiddenLine xmlns:a14="http://schemas.microsoft.com/office/drawing/2010/main" xmlns:p14="http://schemas.microsoft.com/office/powerpoint/2010/main" xmlns:a16="http://schemas.microsoft.com/office/drawing/2014/main" xmlns="" w="9525">
                   <a:solidFill>
                     <a:srgbClr val="000000"/>
                   </a:solidFill>
@@ -18098,7 +18098,7 @@
             </a:ln>
             <a:extLst>
               <a:ext uri="{91240B29-F687-4f45-9708-019B960494DF}">
-                <a14:hiddenLine xmlns="" xmlns:a16="http://schemas.microsoft.com/office/drawing/2014/main" xmlns:p14="http://schemas.microsoft.com/office/powerpoint/2010/main" xmlns:a14="http://schemas.microsoft.com/office/drawing/2010/main" w="9525">
+                <a14:hiddenLine xmlns:a14="http://schemas.microsoft.com/office/drawing/2010/main" xmlns:p14="http://schemas.microsoft.com/office/powerpoint/2010/main" xmlns:a16="http://schemas.microsoft.com/office/drawing/2014/main" xmlns="" w="9525">
                   <a:solidFill>
                     <a:srgbClr val="000000"/>
                   </a:solidFill>
@@ -18178,7 +18178,7 @@
             </a:ln>
             <a:extLst>
               <a:ext uri="{91240B29-F687-4f45-9708-019B960494DF}">
-                <a14:hiddenLine xmlns="" xmlns:a16="http://schemas.microsoft.com/office/drawing/2014/main" xmlns:p14="http://schemas.microsoft.com/office/powerpoint/2010/main" xmlns:a14="http://schemas.microsoft.com/office/drawing/2010/main" w="9525">
+                <a14:hiddenLine xmlns:a14="http://schemas.microsoft.com/office/drawing/2010/main" xmlns:p14="http://schemas.microsoft.com/office/powerpoint/2010/main" xmlns:a16="http://schemas.microsoft.com/office/drawing/2014/main" xmlns="" w="9525">
                   <a:solidFill>
                     <a:srgbClr val="000000"/>
                   </a:solidFill>
@@ -18280,7 +18280,7 @@
             </a:ln>
             <a:extLst>
               <a:ext uri="{91240B29-F687-4f45-9708-019B960494DF}">
-                <a14:hiddenLine xmlns="" xmlns:a16="http://schemas.microsoft.com/office/drawing/2014/main" xmlns:p14="http://schemas.microsoft.com/office/powerpoint/2010/main" xmlns:a14="http://schemas.microsoft.com/office/drawing/2010/main" w="9525">
+                <a14:hiddenLine xmlns:a14="http://schemas.microsoft.com/office/drawing/2010/main" xmlns:p14="http://schemas.microsoft.com/office/powerpoint/2010/main" xmlns:a16="http://schemas.microsoft.com/office/drawing/2014/main" xmlns="" w="9525">
                   <a:solidFill>
                     <a:srgbClr val="000000"/>
                   </a:solidFill>
@@ -18360,7 +18360,7 @@
             </a:ln>
             <a:extLst>
               <a:ext uri="{91240B29-F687-4f45-9708-019B960494DF}">
-                <a14:hiddenLine xmlns="" xmlns:a16="http://schemas.microsoft.com/office/drawing/2014/main" xmlns:p14="http://schemas.microsoft.com/office/powerpoint/2010/main" xmlns:a14="http://schemas.microsoft.com/office/drawing/2010/main" w="9525">
+                <a14:hiddenLine xmlns:a14="http://schemas.microsoft.com/office/drawing/2010/main" xmlns:p14="http://schemas.microsoft.com/office/powerpoint/2010/main" xmlns:a16="http://schemas.microsoft.com/office/drawing/2014/main" xmlns="" w="9525">
                   <a:solidFill>
                     <a:srgbClr val="000000"/>
                   </a:solidFill>
@@ -18462,7 +18462,7 @@
             </a:ln>
             <a:extLst>
               <a:ext uri="{91240B29-F687-4f45-9708-019B960494DF}">
-                <a14:hiddenLine xmlns="" xmlns:a16="http://schemas.microsoft.com/office/drawing/2014/main" xmlns:p14="http://schemas.microsoft.com/office/powerpoint/2010/main" xmlns:a14="http://schemas.microsoft.com/office/drawing/2010/main" w="9525">
+                <a14:hiddenLine xmlns:a14="http://schemas.microsoft.com/office/drawing/2010/main" xmlns:p14="http://schemas.microsoft.com/office/powerpoint/2010/main" xmlns:a16="http://schemas.microsoft.com/office/drawing/2014/main" xmlns="" w="9525">
                   <a:solidFill>
                     <a:srgbClr val="000000"/>
                   </a:solidFill>
@@ -18508,7 +18508,7 @@
             </a:ln>
             <a:extLst>
               <a:ext uri="{91240B29-F687-4f45-9708-019B960494DF}">
-                <a14:hiddenLine xmlns="" xmlns:a16="http://schemas.microsoft.com/office/drawing/2014/main" xmlns:p14="http://schemas.microsoft.com/office/powerpoint/2010/main" xmlns:a14="http://schemas.microsoft.com/office/drawing/2010/main" w="9525">
+                <a14:hiddenLine xmlns:a14="http://schemas.microsoft.com/office/drawing/2010/main" xmlns:p14="http://schemas.microsoft.com/office/powerpoint/2010/main" xmlns:a16="http://schemas.microsoft.com/office/drawing/2014/main" xmlns="" w="9525">
                   <a:solidFill>
                     <a:srgbClr val="000000"/>
                   </a:solidFill>
@@ -18795,7 +18795,7 @@
               </a:ln>
               <a:extLst>
                 <a:ext uri="{91240B29-F687-4f45-9708-019B960494DF}">
-                  <a14:hiddenLine xmlns:a14="http://schemas.microsoft.com/office/drawing/2010/main" xmlns:p14="http://schemas.microsoft.com/office/powerpoint/2010/main" xmlns="" w="9525">
+                  <a14:hiddenLine xmlns="" xmlns:p14="http://schemas.microsoft.com/office/powerpoint/2010/main" xmlns:a14="http://schemas.microsoft.com/office/drawing/2010/main" w="9525">
                     <a:solidFill>
                       <a:srgbClr val="000000"/>
                     </a:solidFill>
@@ -18897,7 +18897,7 @@
               </a:ln>
               <a:extLst>
                 <a:ext uri="{91240B29-F687-4f45-9708-019B960494DF}">
-                  <a14:hiddenLine xmlns:a14="http://schemas.microsoft.com/office/drawing/2010/main" xmlns:p14="http://schemas.microsoft.com/office/powerpoint/2010/main" xmlns="" w="9525">
+                  <a14:hiddenLine xmlns="" xmlns:p14="http://schemas.microsoft.com/office/powerpoint/2010/main" xmlns:a14="http://schemas.microsoft.com/office/drawing/2010/main" w="9525">
                     <a:solidFill>
                       <a:srgbClr val="000000"/>
                     </a:solidFill>
@@ -18999,7 +18999,7 @@
               </a:ln>
               <a:extLst>
                 <a:ext uri="{91240B29-F687-4f45-9708-019B960494DF}">
-                  <a14:hiddenLine xmlns:a14="http://schemas.microsoft.com/office/drawing/2010/main" xmlns:p14="http://schemas.microsoft.com/office/powerpoint/2010/main" xmlns="" w="9525">
+                  <a14:hiddenLine xmlns="" xmlns:p14="http://schemas.microsoft.com/office/powerpoint/2010/main" xmlns:a14="http://schemas.microsoft.com/office/drawing/2010/main" w="9525">
                     <a:solidFill>
                       <a:srgbClr val="000000"/>
                     </a:solidFill>
@@ -19073,7 +19073,7 @@
               </a:ln>
               <a:extLst>
                 <a:ext uri="{91240B29-F687-4f45-9708-019B960494DF}">
-                  <a14:hiddenLine xmlns:a14="http://schemas.microsoft.com/office/drawing/2010/main" xmlns:p14="http://schemas.microsoft.com/office/powerpoint/2010/main" xmlns="" w="9525">
+                  <a14:hiddenLine xmlns="" xmlns:p14="http://schemas.microsoft.com/office/powerpoint/2010/main" xmlns:a14="http://schemas.microsoft.com/office/drawing/2010/main" w="9525">
                     <a:solidFill>
                       <a:srgbClr val="000000"/>
                     </a:solidFill>
@@ -19175,7 +19175,7 @@
               </a:ln>
               <a:extLst>
                 <a:ext uri="{91240B29-F687-4f45-9708-019B960494DF}">
-                  <a14:hiddenLine xmlns:a14="http://schemas.microsoft.com/office/drawing/2010/main" xmlns:p14="http://schemas.microsoft.com/office/powerpoint/2010/main" xmlns="" w="9525">
+                  <a14:hiddenLine xmlns="" xmlns:p14="http://schemas.microsoft.com/office/powerpoint/2010/main" xmlns:a14="http://schemas.microsoft.com/office/drawing/2010/main" w="9525">
                     <a:solidFill>
                       <a:srgbClr val="000000"/>
                     </a:solidFill>
@@ -19249,7 +19249,7 @@
               </a:ln>
               <a:extLst>
                 <a:ext uri="{91240B29-F687-4f45-9708-019B960494DF}">
-                  <a14:hiddenLine xmlns:a14="http://schemas.microsoft.com/office/drawing/2010/main" xmlns:p14="http://schemas.microsoft.com/office/powerpoint/2010/main" xmlns="" w="9525">
+                  <a14:hiddenLine xmlns="" xmlns:p14="http://schemas.microsoft.com/office/powerpoint/2010/main" xmlns:a14="http://schemas.microsoft.com/office/drawing/2010/main" w="9525">
                     <a:solidFill>
                       <a:srgbClr val="000000"/>
                     </a:solidFill>
@@ -19323,7 +19323,7 @@
               </a:ln>
               <a:extLst>
                 <a:ext uri="{91240B29-F687-4f45-9708-019B960494DF}">
-                  <a14:hiddenLine xmlns:a14="http://schemas.microsoft.com/office/drawing/2010/main" xmlns:p14="http://schemas.microsoft.com/office/powerpoint/2010/main" xmlns="" w="9525">
+                  <a14:hiddenLine xmlns="" xmlns:p14="http://schemas.microsoft.com/office/powerpoint/2010/main" xmlns:a14="http://schemas.microsoft.com/office/drawing/2010/main" w="9525">
                     <a:solidFill>
                       <a:srgbClr val="000000"/>
                     </a:solidFill>
@@ -19425,7 +19425,7 @@
               </a:ln>
               <a:extLst>
                 <a:ext uri="{91240B29-F687-4f45-9708-019B960494DF}">
-                  <a14:hiddenLine xmlns:a14="http://schemas.microsoft.com/office/drawing/2010/main" xmlns:p14="http://schemas.microsoft.com/office/powerpoint/2010/main" xmlns="" w="9525">
+                  <a14:hiddenLine xmlns="" xmlns:p14="http://schemas.microsoft.com/office/powerpoint/2010/main" xmlns:a14="http://schemas.microsoft.com/office/drawing/2010/main" w="9525">
                     <a:solidFill>
                       <a:srgbClr val="000000"/>
                     </a:solidFill>
@@ -19527,7 +19527,7 @@
               </a:ln>
               <a:extLst>
                 <a:ext uri="{91240B29-F687-4f45-9708-019B960494DF}">
-                  <a14:hiddenLine xmlns:a14="http://schemas.microsoft.com/office/drawing/2010/main" xmlns:p14="http://schemas.microsoft.com/office/powerpoint/2010/main" xmlns="" w="9525">
+                  <a14:hiddenLine xmlns="" xmlns:p14="http://schemas.microsoft.com/office/powerpoint/2010/main" xmlns:a14="http://schemas.microsoft.com/office/drawing/2010/main" w="9525">
                     <a:solidFill>
                       <a:srgbClr val="000000"/>
                     </a:solidFill>
@@ -19601,7 +19601,7 @@
               </a:ln>
               <a:extLst>
                 <a:ext uri="{91240B29-F687-4f45-9708-019B960494DF}">
-                  <a14:hiddenLine xmlns:a14="http://schemas.microsoft.com/office/drawing/2010/main" xmlns:p14="http://schemas.microsoft.com/office/powerpoint/2010/main" xmlns="" w="9525">
+                  <a14:hiddenLine xmlns="" xmlns:p14="http://schemas.microsoft.com/office/powerpoint/2010/main" xmlns:a14="http://schemas.microsoft.com/office/drawing/2010/main" w="9525">
                     <a:solidFill>
                       <a:srgbClr val="000000"/>
                     </a:solidFill>
@@ -19723,7 +19723,7 @@
               </a:ln>
               <a:extLst>
                 <a:ext uri="{91240B29-F687-4f45-9708-019B960494DF}">
-                  <a14:hiddenLine xmlns:a14="http://schemas.microsoft.com/office/drawing/2010/main" xmlns:p14="http://schemas.microsoft.com/office/powerpoint/2010/main" xmlns="" w="9525">
+                  <a14:hiddenLine xmlns="" xmlns:p14="http://schemas.microsoft.com/office/powerpoint/2010/main" xmlns:a14="http://schemas.microsoft.com/office/drawing/2010/main" w="9525">
                     <a:solidFill>
                       <a:srgbClr val="000000"/>
                     </a:solidFill>
@@ -19831,7 +19831,7 @@
               </a:ln>
               <a:extLst>
                 <a:ext uri="{91240B29-F687-4f45-9708-019B960494DF}">
-                  <a14:hiddenLine xmlns:a14="http://schemas.microsoft.com/office/drawing/2010/main" xmlns:p14="http://schemas.microsoft.com/office/powerpoint/2010/main" xmlns="" w="9525">
+                  <a14:hiddenLine xmlns="" xmlns:p14="http://schemas.microsoft.com/office/powerpoint/2010/main" xmlns:a14="http://schemas.microsoft.com/office/drawing/2010/main" w="9525">
                     <a:solidFill>
                       <a:srgbClr val="000000"/>
                     </a:solidFill>
@@ -19905,7 +19905,7 @@
               </a:ln>
               <a:extLst>
                 <a:ext uri="{91240B29-F687-4f45-9708-019B960494DF}">
-                  <a14:hiddenLine xmlns:a14="http://schemas.microsoft.com/office/drawing/2010/main" xmlns:p14="http://schemas.microsoft.com/office/powerpoint/2010/main" xmlns="" w="9525">
+                  <a14:hiddenLine xmlns="" xmlns:p14="http://schemas.microsoft.com/office/powerpoint/2010/main" xmlns:a14="http://schemas.microsoft.com/office/drawing/2010/main" w="9525">
                     <a:solidFill>
                       <a:srgbClr val="000000"/>
                     </a:solidFill>
@@ -19979,7 +19979,7 @@
               </a:ln>
               <a:extLst>
                 <a:ext uri="{91240B29-F687-4f45-9708-019B960494DF}">
-                  <a14:hiddenLine xmlns:a14="http://schemas.microsoft.com/office/drawing/2010/main" xmlns:p14="http://schemas.microsoft.com/office/powerpoint/2010/main" xmlns="" w="9525">
+                  <a14:hiddenLine xmlns="" xmlns:p14="http://schemas.microsoft.com/office/powerpoint/2010/main" xmlns:a14="http://schemas.microsoft.com/office/drawing/2010/main" w="9525">
                     <a:solidFill>
                       <a:srgbClr val="000000"/>
                     </a:solidFill>
@@ -20081,7 +20081,7 @@
               </a:ln>
               <a:extLst>
                 <a:ext uri="{91240B29-F687-4f45-9708-019B960494DF}">
-                  <a14:hiddenLine xmlns:a14="http://schemas.microsoft.com/office/drawing/2010/main" xmlns:p14="http://schemas.microsoft.com/office/powerpoint/2010/main" xmlns="" w="9525">
+                  <a14:hiddenLine xmlns="" xmlns:p14="http://schemas.microsoft.com/office/powerpoint/2010/main" xmlns:a14="http://schemas.microsoft.com/office/drawing/2010/main" w="9525">
                     <a:solidFill>
                       <a:srgbClr val="000000"/>
                     </a:solidFill>
@@ -20127,7 +20127,7 @@
               </a:ln>
               <a:extLst>
                 <a:ext uri="{91240B29-F687-4f45-9708-019B960494DF}">
-                  <a14:hiddenLine xmlns:a14="http://schemas.microsoft.com/office/drawing/2010/main" xmlns:p14="http://schemas.microsoft.com/office/powerpoint/2010/main" xmlns="" w="9525">
+                  <a14:hiddenLine xmlns="" xmlns:p14="http://schemas.microsoft.com/office/powerpoint/2010/main" xmlns:a14="http://schemas.microsoft.com/office/drawing/2010/main" w="9525">
                     <a:solidFill>
                       <a:srgbClr val="000000"/>
                     </a:solidFill>
@@ -20204,7 +20204,7 @@
               </a:ln>
               <a:extLst>
                 <a:ext uri="{91240B29-F687-4f45-9708-019B960494DF}">
-                  <a14:hiddenLine xmlns:a14="http://schemas.microsoft.com/office/drawing/2010/main" xmlns:p14="http://schemas.microsoft.com/office/powerpoint/2010/main" xmlns="" w="9525">
+                  <a14:hiddenLine xmlns="" xmlns:p14="http://schemas.microsoft.com/office/powerpoint/2010/main" xmlns:a14="http://schemas.microsoft.com/office/drawing/2010/main" w="9525">
                     <a:solidFill>
                       <a:srgbClr val="000000"/>
                     </a:solidFill>
@@ -20306,7 +20306,7 @@
               </a:ln>
               <a:extLst>
                 <a:ext uri="{91240B29-F687-4f45-9708-019B960494DF}">
-                  <a14:hiddenLine xmlns:a14="http://schemas.microsoft.com/office/drawing/2010/main" xmlns:p14="http://schemas.microsoft.com/office/powerpoint/2010/main" xmlns="" w="9525">
+                  <a14:hiddenLine xmlns="" xmlns:p14="http://schemas.microsoft.com/office/powerpoint/2010/main" xmlns:a14="http://schemas.microsoft.com/office/drawing/2010/main" w="9525">
                     <a:solidFill>
                       <a:srgbClr val="000000"/>
                     </a:solidFill>
@@ -20380,7 +20380,7 @@
               </a:ln>
               <a:extLst>
                 <a:ext uri="{91240B29-F687-4f45-9708-019B960494DF}">
-                  <a14:hiddenLine xmlns:a14="http://schemas.microsoft.com/office/drawing/2010/main" xmlns:p14="http://schemas.microsoft.com/office/powerpoint/2010/main" xmlns="" w="9525">
+                  <a14:hiddenLine xmlns="" xmlns:p14="http://schemas.microsoft.com/office/powerpoint/2010/main" xmlns:a14="http://schemas.microsoft.com/office/drawing/2010/main" w="9525">
                     <a:solidFill>
                       <a:srgbClr val="000000"/>
                     </a:solidFill>
@@ -20482,7 +20482,7 @@
               </a:ln>
               <a:extLst>
                 <a:ext uri="{91240B29-F687-4f45-9708-019B960494DF}">
-                  <a14:hiddenLine xmlns:a14="http://schemas.microsoft.com/office/drawing/2010/main" xmlns:p14="http://schemas.microsoft.com/office/powerpoint/2010/main" xmlns="" w="9525">
+                  <a14:hiddenLine xmlns="" xmlns:p14="http://schemas.microsoft.com/office/powerpoint/2010/main" xmlns:a14="http://schemas.microsoft.com/office/drawing/2010/main" w="9525">
                     <a:solidFill>
                       <a:srgbClr val="000000"/>
                     </a:solidFill>
@@ -20559,7 +20559,7 @@
               </a:ln>
               <a:extLst>
                 <a:ext uri="{91240B29-F687-4f45-9708-019B960494DF}">
-                  <a14:hiddenLine xmlns:a14="http://schemas.microsoft.com/office/drawing/2010/main" xmlns:p14="http://schemas.microsoft.com/office/powerpoint/2010/main" xmlns="" w="9525">
+                  <a14:hiddenLine xmlns="" xmlns:p14="http://schemas.microsoft.com/office/powerpoint/2010/main" xmlns:a14="http://schemas.microsoft.com/office/drawing/2010/main" w="9525">
                     <a:solidFill>
                       <a:srgbClr val="000000"/>
                     </a:solidFill>
@@ -20633,7 +20633,7 @@
               </a:ln>
               <a:extLst>
                 <a:ext uri="{91240B29-F687-4f45-9708-019B960494DF}">
-                  <a14:hiddenLine xmlns:a14="http://schemas.microsoft.com/office/drawing/2010/main" xmlns:p14="http://schemas.microsoft.com/office/powerpoint/2010/main" xmlns="" w="9525">
+                  <a14:hiddenLine xmlns="" xmlns:p14="http://schemas.microsoft.com/office/powerpoint/2010/main" xmlns:a14="http://schemas.microsoft.com/office/drawing/2010/main" w="9525">
                     <a:solidFill>
                       <a:srgbClr val="000000"/>
                     </a:solidFill>
@@ -20735,7 +20735,7 @@
               </a:ln>
               <a:extLst>
                 <a:ext uri="{91240B29-F687-4f45-9708-019B960494DF}">
-                  <a14:hiddenLine xmlns:a14="http://schemas.microsoft.com/office/drawing/2010/main" xmlns:p14="http://schemas.microsoft.com/office/powerpoint/2010/main" xmlns="" w="9525">
+                  <a14:hiddenLine xmlns="" xmlns:p14="http://schemas.microsoft.com/office/powerpoint/2010/main" xmlns:a14="http://schemas.microsoft.com/office/drawing/2010/main" w="9525">
                     <a:solidFill>
                       <a:srgbClr val="000000"/>
                     </a:solidFill>
@@ -20837,7 +20837,7 @@
               </a:ln>
               <a:extLst>
                 <a:ext uri="{91240B29-F687-4f45-9708-019B960494DF}">
-                  <a14:hiddenLine xmlns:a14="http://schemas.microsoft.com/office/drawing/2010/main" xmlns:p14="http://schemas.microsoft.com/office/powerpoint/2010/main" xmlns="" w="9525">
+                  <a14:hiddenLine xmlns="" xmlns:p14="http://schemas.microsoft.com/office/powerpoint/2010/main" xmlns:a14="http://schemas.microsoft.com/office/drawing/2010/main" w="9525">
                     <a:solidFill>
                       <a:srgbClr val="000000"/>
                     </a:solidFill>
@@ -20914,7 +20914,7 @@
               </a:ln>
               <a:extLst>
                 <a:ext uri="{91240B29-F687-4f45-9708-019B960494DF}">
-                  <a14:hiddenLine xmlns:a14="http://schemas.microsoft.com/office/drawing/2010/main" xmlns:p14="http://schemas.microsoft.com/office/powerpoint/2010/main" xmlns="" w="9525">
+                  <a14:hiddenLine xmlns="" xmlns:p14="http://schemas.microsoft.com/office/powerpoint/2010/main" xmlns:a14="http://schemas.microsoft.com/office/drawing/2010/main" w="9525">
                     <a:solidFill>
                       <a:srgbClr val="000000"/>
                     </a:solidFill>
@@ -21046,7 +21046,7 @@
               </a:ln>
               <a:extLst>
                 <a:ext uri="{91240B29-F687-4f45-9708-019B960494DF}">
-                  <a14:hiddenLine xmlns:a14="http://schemas.microsoft.com/office/drawing/2010/main" xmlns:p14="http://schemas.microsoft.com/office/powerpoint/2010/main" xmlns="" w="9525">
+                  <a14:hiddenLine xmlns="" xmlns:p14="http://schemas.microsoft.com/office/powerpoint/2010/main" xmlns:a14="http://schemas.microsoft.com/office/drawing/2010/main" w="9525">
                     <a:solidFill>
                       <a:srgbClr val="000000"/>
                     </a:solidFill>
@@ -21165,7 +21165,7 @@
               </a:ln>
               <a:extLst>
                 <a:ext uri="{91240B29-F687-4f45-9708-019B960494DF}">
-                  <a14:hiddenLine xmlns:a14="http://schemas.microsoft.com/office/drawing/2010/main" xmlns:p14="http://schemas.microsoft.com/office/powerpoint/2010/main" xmlns="" w="9525">
+                  <a14:hiddenLine xmlns="" xmlns:p14="http://schemas.microsoft.com/office/powerpoint/2010/main" xmlns:a14="http://schemas.microsoft.com/office/drawing/2010/main" w="9525">
                     <a:solidFill>
                       <a:srgbClr val="000000"/>
                     </a:solidFill>
@@ -21292,7 +21292,7 @@
               </a:ln>
               <a:extLst>
                 <a:ext uri="{91240B29-F687-4f45-9708-019B960494DF}">
-                  <a14:hiddenLine xmlns:a14="http://schemas.microsoft.com/office/drawing/2010/main" xmlns:p14="http://schemas.microsoft.com/office/powerpoint/2010/main" xmlns="" w="9525">
+                  <a14:hiddenLine xmlns="" xmlns:p14="http://schemas.microsoft.com/office/powerpoint/2010/main" xmlns:a14="http://schemas.microsoft.com/office/drawing/2010/main" w="9525">
                     <a:solidFill>
                       <a:srgbClr val="000000"/>
                     </a:solidFill>
@@ -21394,7 +21394,7 @@
               </a:ln>
               <a:extLst>
                 <a:ext uri="{91240B29-F687-4f45-9708-019B960494DF}">
-                  <a14:hiddenLine xmlns:a14="http://schemas.microsoft.com/office/drawing/2010/main" xmlns:p14="http://schemas.microsoft.com/office/powerpoint/2010/main" xmlns="" w="9525">
+                  <a14:hiddenLine xmlns="" xmlns:p14="http://schemas.microsoft.com/office/powerpoint/2010/main" xmlns:a14="http://schemas.microsoft.com/office/drawing/2010/main" w="9525">
                     <a:solidFill>
                       <a:srgbClr val="000000"/>
                     </a:solidFill>
@@ -21471,7 +21471,7 @@
               </a:ln>
               <a:extLst>
                 <a:ext uri="{91240B29-F687-4f45-9708-019B960494DF}">
-                  <a14:hiddenLine xmlns:a14="http://schemas.microsoft.com/office/drawing/2010/main" xmlns:p14="http://schemas.microsoft.com/office/powerpoint/2010/main" xmlns="" w="9525">
+                  <a14:hiddenLine xmlns="" xmlns:p14="http://schemas.microsoft.com/office/powerpoint/2010/main" xmlns:a14="http://schemas.microsoft.com/office/drawing/2010/main" w="9525">
                     <a:solidFill>
                       <a:srgbClr val="000000"/>
                     </a:solidFill>
@@ -21573,7 +21573,7 @@
               </a:ln>
               <a:extLst>
                 <a:ext uri="{91240B29-F687-4f45-9708-019B960494DF}">
-                  <a14:hiddenLine xmlns:a14="http://schemas.microsoft.com/office/drawing/2010/main" xmlns:p14="http://schemas.microsoft.com/office/powerpoint/2010/main" xmlns="" w="9525">
+                  <a14:hiddenLine xmlns="" xmlns:p14="http://schemas.microsoft.com/office/powerpoint/2010/main" xmlns:a14="http://schemas.microsoft.com/office/drawing/2010/main" w="9525">
                     <a:solidFill>
                       <a:srgbClr val="000000"/>
                     </a:solidFill>
@@ -21653,7 +21653,7 @@
               </a:ln>
               <a:extLst>
                 <a:ext uri="{91240B29-F687-4f45-9708-019B960494DF}">
-                  <a14:hiddenLine xmlns:a14="http://schemas.microsoft.com/office/drawing/2010/main" xmlns:p14="http://schemas.microsoft.com/office/powerpoint/2010/main" xmlns="" w="9525">
+                  <a14:hiddenLine xmlns="" xmlns:p14="http://schemas.microsoft.com/office/powerpoint/2010/main" xmlns:a14="http://schemas.microsoft.com/office/drawing/2010/main" w="9525">
                     <a:solidFill>
                       <a:srgbClr val="000000"/>
                     </a:solidFill>
@@ -21755,7 +21755,7 @@
               </a:ln>
               <a:extLst>
                 <a:ext uri="{91240B29-F687-4f45-9708-019B960494DF}">
-                  <a14:hiddenLine xmlns:a14="http://schemas.microsoft.com/office/drawing/2010/main" xmlns:p14="http://schemas.microsoft.com/office/powerpoint/2010/main" xmlns="" w="9525">
+                  <a14:hiddenLine xmlns="" xmlns:p14="http://schemas.microsoft.com/office/powerpoint/2010/main" xmlns:a14="http://schemas.microsoft.com/office/drawing/2010/main" w="9525">
                     <a:solidFill>
                       <a:srgbClr val="000000"/>
                     </a:solidFill>
@@ -21835,7 +21835,7 @@
               </a:ln>
               <a:extLst>
                 <a:ext uri="{91240B29-F687-4f45-9708-019B960494DF}">
-                  <a14:hiddenLine xmlns:a14="http://schemas.microsoft.com/office/drawing/2010/main" xmlns:p14="http://schemas.microsoft.com/office/powerpoint/2010/main" xmlns="" w="9525">
+                  <a14:hiddenLine xmlns="" xmlns:p14="http://schemas.microsoft.com/office/powerpoint/2010/main" xmlns:a14="http://schemas.microsoft.com/office/drawing/2010/main" w="9525">
                     <a:solidFill>
                       <a:srgbClr val="000000"/>
                     </a:solidFill>
@@ -21937,7 +21937,7 @@
               </a:ln>
               <a:extLst>
                 <a:ext uri="{91240B29-F687-4f45-9708-019B960494DF}">
-                  <a14:hiddenLine xmlns:a14="http://schemas.microsoft.com/office/drawing/2010/main" xmlns:p14="http://schemas.microsoft.com/office/powerpoint/2010/main" xmlns="" w="9525">
+                  <a14:hiddenLine xmlns="" xmlns:p14="http://schemas.microsoft.com/office/powerpoint/2010/main" xmlns:a14="http://schemas.microsoft.com/office/drawing/2010/main" w="9525">
                     <a:solidFill>
                       <a:srgbClr val="000000"/>
                     </a:solidFill>
@@ -21983,7 +21983,7 @@
               </a:ln>
               <a:extLst>
                 <a:ext uri="{91240B29-F687-4f45-9708-019B960494DF}">
-                  <a14:hiddenLine xmlns:a14="http://schemas.microsoft.com/office/drawing/2010/main" xmlns:p14="http://schemas.microsoft.com/office/powerpoint/2010/main" xmlns="" w="9525">
+                  <a14:hiddenLine xmlns="" xmlns:p14="http://schemas.microsoft.com/office/powerpoint/2010/main" xmlns:a14="http://schemas.microsoft.com/office/drawing/2010/main" w="9525">
                     <a:solidFill>
                       <a:srgbClr val="000000"/>
                     </a:solidFill>
@@ -22042,7 +22042,7 @@
           <a:noFill/>
           <a:extLst>
             <a:ext uri="{909E8E84-426E-40dd-AFC4-6F175D3DCCD1}">
-              <a14:hiddenFill xmlns:a14="http://schemas.microsoft.com/office/drawing/2010/main" xmlns:p14="http://schemas.microsoft.com/office/powerpoint/2010/main" xmlns="">
+              <a14:hiddenFill xmlns="" xmlns:p14="http://schemas.microsoft.com/office/powerpoint/2010/main" xmlns:a14="http://schemas.microsoft.com/office/drawing/2010/main">
                 <a:solidFill>
                   <a:srgbClr val="FFFFFF"/>
                 </a:solidFill>
@@ -22438,7 +22438,7 @@
             </a:ln>
             <a:extLst>
               <a:ext uri="{91240B29-F687-4f45-9708-019B960494DF}">
-                <a14:hiddenLine xmlns="" xmlns:a16="http://schemas.microsoft.com/office/drawing/2014/main" xmlns:p14="http://schemas.microsoft.com/office/powerpoint/2010/main" xmlns:a14="http://schemas.microsoft.com/office/drawing/2010/main" w="9525">
+                <a14:hiddenLine xmlns:a14="http://schemas.microsoft.com/office/drawing/2010/main" xmlns:p14="http://schemas.microsoft.com/office/powerpoint/2010/main" xmlns:a16="http://schemas.microsoft.com/office/drawing/2014/main" xmlns="" w="9525">
                   <a:solidFill>
                     <a:srgbClr val="000000"/>
                   </a:solidFill>
@@ -22540,7 +22540,7 @@
             </a:ln>
             <a:extLst>
               <a:ext uri="{91240B29-F687-4f45-9708-019B960494DF}">
-                <a14:hiddenLine xmlns="" xmlns:a16="http://schemas.microsoft.com/office/drawing/2014/main" xmlns:p14="http://schemas.microsoft.com/office/powerpoint/2010/main" xmlns:a14="http://schemas.microsoft.com/office/drawing/2010/main" w="9525">
+                <a14:hiddenLine xmlns:a14="http://schemas.microsoft.com/office/drawing/2010/main" xmlns:p14="http://schemas.microsoft.com/office/powerpoint/2010/main" xmlns:a16="http://schemas.microsoft.com/office/drawing/2014/main" xmlns="" w="9525">
                   <a:solidFill>
                     <a:srgbClr val="000000"/>
                   </a:solidFill>
@@ -22642,7 +22642,7 @@
             </a:ln>
             <a:extLst>
               <a:ext uri="{91240B29-F687-4f45-9708-019B960494DF}">
-                <a14:hiddenLine xmlns="" xmlns:a16="http://schemas.microsoft.com/office/drawing/2014/main" xmlns:p14="http://schemas.microsoft.com/office/powerpoint/2010/main" xmlns:a14="http://schemas.microsoft.com/office/drawing/2010/main" w="9525">
+                <a14:hiddenLine xmlns:a14="http://schemas.microsoft.com/office/drawing/2010/main" xmlns:p14="http://schemas.microsoft.com/office/powerpoint/2010/main" xmlns:a16="http://schemas.microsoft.com/office/drawing/2014/main" xmlns="" w="9525">
                   <a:solidFill>
                     <a:srgbClr val="000000"/>
                   </a:solidFill>
@@ -22716,7 +22716,7 @@
             </a:ln>
             <a:extLst>
               <a:ext uri="{91240B29-F687-4f45-9708-019B960494DF}">
-                <a14:hiddenLine xmlns="" xmlns:a16="http://schemas.microsoft.com/office/drawing/2014/main" xmlns:p14="http://schemas.microsoft.com/office/powerpoint/2010/main" xmlns:a14="http://schemas.microsoft.com/office/drawing/2010/main" w="9525">
+                <a14:hiddenLine xmlns:a14="http://schemas.microsoft.com/office/drawing/2010/main" xmlns:p14="http://schemas.microsoft.com/office/powerpoint/2010/main" xmlns:a16="http://schemas.microsoft.com/office/drawing/2014/main" xmlns="" w="9525">
                   <a:solidFill>
                     <a:srgbClr val="000000"/>
                   </a:solidFill>
@@ -22818,7 +22818,7 @@
             </a:ln>
             <a:extLst>
               <a:ext uri="{91240B29-F687-4f45-9708-019B960494DF}">
-                <a14:hiddenLine xmlns="" xmlns:a16="http://schemas.microsoft.com/office/drawing/2014/main" xmlns:p14="http://schemas.microsoft.com/office/powerpoint/2010/main" xmlns:a14="http://schemas.microsoft.com/office/drawing/2010/main" w="9525">
+                <a14:hiddenLine xmlns:a14="http://schemas.microsoft.com/office/drawing/2010/main" xmlns:p14="http://schemas.microsoft.com/office/powerpoint/2010/main" xmlns:a16="http://schemas.microsoft.com/office/drawing/2014/main" xmlns="" w="9525">
                   <a:solidFill>
                     <a:srgbClr val="000000"/>
                   </a:solidFill>
@@ -22892,7 +22892,7 @@
             </a:ln>
             <a:extLst>
               <a:ext uri="{91240B29-F687-4f45-9708-019B960494DF}">
-                <a14:hiddenLine xmlns="" xmlns:a16="http://schemas.microsoft.com/office/drawing/2014/main" xmlns:p14="http://schemas.microsoft.com/office/powerpoint/2010/main" xmlns:a14="http://schemas.microsoft.com/office/drawing/2010/main" w="9525">
+                <a14:hiddenLine xmlns:a14="http://schemas.microsoft.com/office/drawing/2010/main" xmlns:p14="http://schemas.microsoft.com/office/powerpoint/2010/main" xmlns:a16="http://schemas.microsoft.com/office/drawing/2014/main" xmlns="" w="9525">
                   <a:solidFill>
                     <a:srgbClr val="000000"/>
                   </a:solidFill>
@@ -22966,7 +22966,7 @@
             </a:ln>
             <a:extLst>
               <a:ext uri="{91240B29-F687-4f45-9708-019B960494DF}">
-                <a14:hiddenLine xmlns="" xmlns:a16="http://schemas.microsoft.com/office/drawing/2014/main" xmlns:p14="http://schemas.microsoft.com/office/powerpoint/2010/main" xmlns:a14="http://schemas.microsoft.com/office/drawing/2010/main" w="9525">
+                <a14:hiddenLine xmlns:a14="http://schemas.microsoft.com/office/drawing/2010/main" xmlns:p14="http://schemas.microsoft.com/office/powerpoint/2010/main" xmlns:a16="http://schemas.microsoft.com/office/drawing/2014/main" xmlns="" w="9525">
                   <a:solidFill>
                     <a:srgbClr val="000000"/>
                   </a:solidFill>
@@ -23068,7 +23068,7 @@
             </a:ln>
             <a:extLst>
               <a:ext uri="{91240B29-F687-4f45-9708-019B960494DF}">
-                <a14:hiddenLine xmlns="" xmlns:a16="http://schemas.microsoft.com/office/drawing/2014/main" xmlns:p14="http://schemas.microsoft.com/office/powerpoint/2010/main" xmlns:a14="http://schemas.microsoft.com/office/drawing/2010/main" w="9525">
+                <a14:hiddenLine xmlns:a14="http://schemas.microsoft.com/office/drawing/2010/main" xmlns:p14="http://schemas.microsoft.com/office/powerpoint/2010/main" xmlns:a16="http://schemas.microsoft.com/office/drawing/2014/main" xmlns="" w="9525">
                   <a:solidFill>
                     <a:srgbClr val="000000"/>
                   </a:solidFill>
@@ -23170,7 +23170,7 @@
             </a:ln>
             <a:extLst>
               <a:ext uri="{91240B29-F687-4f45-9708-019B960494DF}">
-                <a14:hiddenLine xmlns="" xmlns:a16="http://schemas.microsoft.com/office/drawing/2014/main" xmlns:p14="http://schemas.microsoft.com/office/powerpoint/2010/main" xmlns:a14="http://schemas.microsoft.com/office/drawing/2010/main" w="9525">
+                <a14:hiddenLine xmlns:a14="http://schemas.microsoft.com/office/drawing/2010/main" xmlns:p14="http://schemas.microsoft.com/office/powerpoint/2010/main" xmlns:a16="http://schemas.microsoft.com/office/drawing/2014/main" xmlns="" w="9525">
                   <a:solidFill>
                     <a:srgbClr val="000000"/>
                   </a:solidFill>
@@ -23244,7 +23244,7 @@
             </a:ln>
             <a:extLst>
               <a:ext uri="{91240B29-F687-4f45-9708-019B960494DF}">
-                <a14:hiddenLine xmlns="" xmlns:a16="http://schemas.microsoft.com/office/drawing/2014/main" xmlns:p14="http://schemas.microsoft.com/office/powerpoint/2010/main" xmlns:a14="http://schemas.microsoft.com/office/drawing/2010/main" w="9525">
+                <a14:hiddenLine xmlns:a14="http://schemas.microsoft.com/office/drawing/2010/main" xmlns:p14="http://schemas.microsoft.com/office/powerpoint/2010/main" xmlns:a16="http://schemas.microsoft.com/office/drawing/2014/main" xmlns="" w="9525">
                   <a:solidFill>
                     <a:srgbClr val="000000"/>
                   </a:solidFill>
@@ -23366,7 +23366,7 @@
             </a:ln>
             <a:extLst>
               <a:ext uri="{91240B29-F687-4f45-9708-019B960494DF}">
-                <a14:hiddenLine xmlns="" xmlns:a16="http://schemas.microsoft.com/office/drawing/2014/main" xmlns:p14="http://schemas.microsoft.com/office/powerpoint/2010/main" xmlns:a14="http://schemas.microsoft.com/office/drawing/2010/main" w="9525">
+                <a14:hiddenLine xmlns:a14="http://schemas.microsoft.com/office/drawing/2010/main" xmlns:p14="http://schemas.microsoft.com/office/powerpoint/2010/main" xmlns:a16="http://schemas.microsoft.com/office/drawing/2014/main" xmlns="" w="9525">
                   <a:solidFill>
                     <a:srgbClr val="000000"/>
                   </a:solidFill>
@@ -23474,7 +23474,7 @@
             </a:ln>
             <a:extLst>
               <a:ext uri="{91240B29-F687-4f45-9708-019B960494DF}">
-                <a14:hiddenLine xmlns="" xmlns:a16="http://schemas.microsoft.com/office/drawing/2014/main" xmlns:p14="http://schemas.microsoft.com/office/powerpoint/2010/main" xmlns:a14="http://schemas.microsoft.com/office/drawing/2010/main" w="9525">
+                <a14:hiddenLine xmlns:a14="http://schemas.microsoft.com/office/drawing/2010/main" xmlns:p14="http://schemas.microsoft.com/office/powerpoint/2010/main" xmlns:a16="http://schemas.microsoft.com/office/drawing/2014/main" xmlns="" w="9525">
                   <a:solidFill>
                     <a:srgbClr val="000000"/>
                   </a:solidFill>
@@ -23548,7 +23548,7 @@
             </a:ln>
             <a:extLst>
               <a:ext uri="{91240B29-F687-4f45-9708-019B960494DF}">
-                <a14:hiddenLine xmlns="" xmlns:a16="http://schemas.microsoft.com/office/drawing/2014/main" xmlns:p14="http://schemas.microsoft.com/office/powerpoint/2010/main" xmlns:a14="http://schemas.microsoft.com/office/drawing/2010/main" w="9525">
+                <a14:hiddenLine xmlns:a14="http://schemas.microsoft.com/office/drawing/2010/main" xmlns:p14="http://schemas.microsoft.com/office/powerpoint/2010/main" xmlns:a16="http://schemas.microsoft.com/office/drawing/2014/main" xmlns="" w="9525">
                   <a:solidFill>
                     <a:srgbClr val="000000"/>
                   </a:solidFill>
@@ -23622,7 +23622,7 @@
             </a:ln>
             <a:extLst>
               <a:ext uri="{91240B29-F687-4f45-9708-019B960494DF}">
-                <a14:hiddenLine xmlns="" xmlns:a16="http://schemas.microsoft.com/office/drawing/2014/main" xmlns:p14="http://schemas.microsoft.com/office/powerpoint/2010/main" xmlns:a14="http://schemas.microsoft.com/office/drawing/2010/main" w="9525">
+                <a14:hiddenLine xmlns:a14="http://schemas.microsoft.com/office/drawing/2010/main" xmlns:p14="http://schemas.microsoft.com/office/powerpoint/2010/main" xmlns:a16="http://schemas.microsoft.com/office/drawing/2014/main" xmlns="" w="9525">
                   <a:solidFill>
                     <a:srgbClr val="000000"/>
                   </a:solidFill>
@@ -23724,7 +23724,7 @@
             </a:ln>
             <a:extLst>
               <a:ext uri="{91240B29-F687-4f45-9708-019B960494DF}">
-                <a14:hiddenLine xmlns="" xmlns:a16="http://schemas.microsoft.com/office/drawing/2014/main" xmlns:p14="http://schemas.microsoft.com/office/powerpoint/2010/main" xmlns:a14="http://schemas.microsoft.com/office/drawing/2010/main" w="9525">
+                <a14:hiddenLine xmlns:a14="http://schemas.microsoft.com/office/drawing/2010/main" xmlns:p14="http://schemas.microsoft.com/office/powerpoint/2010/main" xmlns:a16="http://schemas.microsoft.com/office/drawing/2014/main" xmlns="" w="9525">
                   <a:solidFill>
                     <a:srgbClr val="000000"/>
                   </a:solidFill>
@@ -23770,7 +23770,7 @@
             </a:ln>
             <a:extLst>
               <a:ext uri="{91240B29-F687-4f45-9708-019B960494DF}">
-                <a14:hiddenLine xmlns="" xmlns:a16="http://schemas.microsoft.com/office/drawing/2014/main" xmlns:p14="http://schemas.microsoft.com/office/powerpoint/2010/main" xmlns:a14="http://schemas.microsoft.com/office/drawing/2010/main" w="9525">
+                <a14:hiddenLine xmlns:a14="http://schemas.microsoft.com/office/drawing/2010/main" xmlns:p14="http://schemas.microsoft.com/office/powerpoint/2010/main" xmlns:a16="http://schemas.microsoft.com/office/drawing/2014/main" xmlns="" w="9525">
                   <a:solidFill>
                     <a:srgbClr val="000000"/>
                   </a:solidFill>
@@ -23847,7 +23847,7 @@
             </a:ln>
             <a:extLst>
               <a:ext uri="{91240B29-F687-4f45-9708-019B960494DF}">
-                <a14:hiddenLine xmlns="" xmlns:a16="http://schemas.microsoft.com/office/drawing/2014/main" xmlns:p14="http://schemas.microsoft.com/office/powerpoint/2010/main" xmlns:a14="http://schemas.microsoft.com/office/drawing/2010/main" w="9525">
+                <a14:hiddenLine xmlns:a14="http://schemas.microsoft.com/office/drawing/2010/main" xmlns:p14="http://schemas.microsoft.com/office/powerpoint/2010/main" xmlns:a16="http://schemas.microsoft.com/office/drawing/2014/main" xmlns="" w="9525">
                   <a:solidFill>
                     <a:srgbClr val="000000"/>
                   </a:solidFill>
@@ -23949,7 +23949,7 @@
             </a:ln>
             <a:extLst>
               <a:ext uri="{91240B29-F687-4f45-9708-019B960494DF}">
-                <a14:hiddenLine xmlns="" xmlns:a16="http://schemas.microsoft.com/office/drawing/2014/main" xmlns:p14="http://schemas.microsoft.com/office/powerpoint/2010/main" xmlns:a14="http://schemas.microsoft.com/office/drawing/2010/main" w="9525">
+                <a14:hiddenLine xmlns:a14="http://schemas.microsoft.com/office/drawing/2010/main" xmlns:p14="http://schemas.microsoft.com/office/powerpoint/2010/main" xmlns:a16="http://schemas.microsoft.com/office/drawing/2014/main" xmlns="" w="9525">
                   <a:solidFill>
                     <a:srgbClr val="000000"/>
                   </a:solidFill>
@@ -24023,7 +24023,7 @@
             </a:ln>
             <a:extLst>
               <a:ext uri="{91240B29-F687-4f45-9708-019B960494DF}">
-                <a14:hiddenLine xmlns="" xmlns:a16="http://schemas.microsoft.com/office/drawing/2014/main" xmlns:p14="http://schemas.microsoft.com/office/powerpoint/2010/main" xmlns:a14="http://schemas.microsoft.com/office/drawing/2010/main" w="9525">
+                <a14:hiddenLine xmlns:a14="http://schemas.microsoft.com/office/drawing/2010/main" xmlns:p14="http://schemas.microsoft.com/office/powerpoint/2010/main" xmlns:a16="http://schemas.microsoft.com/office/drawing/2014/main" xmlns="" w="9525">
                   <a:solidFill>
                     <a:srgbClr val="000000"/>
                   </a:solidFill>
@@ -24125,7 +24125,7 @@
             </a:ln>
             <a:extLst>
               <a:ext uri="{91240B29-F687-4f45-9708-019B960494DF}">
-                <a14:hiddenLine xmlns="" xmlns:a16="http://schemas.microsoft.com/office/drawing/2014/main" xmlns:p14="http://schemas.microsoft.com/office/powerpoint/2010/main" xmlns:a14="http://schemas.microsoft.com/office/drawing/2010/main" w="9525">
+                <a14:hiddenLine xmlns:a14="http://schemas.microsoft.com/office/drawing/2010/main" xmlns:p14="http://schemas.microsoft.com/office/powerpoint/2010/main" xmlns:a16="http://schemas.microsoft.com/office/drawing/2014/main" xmlns="" w="9525">
                   <a:solidFill>
                     <a:srgbClr val="000000"/>
                   </a:solidFill>
@@ -24202,7 +24202,7 @@
             </a:ln>
             <a:extLst>
               <a:ext uri="{91240B29-F687-4f45-9708-019B960494DF}">
-                <a14:hiddenLine xmlns="" xmlns:a16="http://schemas.microsoft.com/office/drawing/2014/main" xmlns:p14="http://schemas.microsoft.com/office/powerpoint/2010/main" xmlns:a14="http://schemas.microsoft.com/office/drawing/2010/main" w="9525">
+                <a14:hiddenLine xmlns:a14="http://schemas.microsoft.com/office/drawing/2010/main" xmlns:p14="http://schemas.microsoft.com/office/powerpoint/2010/main" xmlns:a16="http://schemas.microsoft.com/office/drawing/2014/main" xmlns="" w="9525">
                   <a:solidFill>
                     <a:srgbClr val="000000"/>
                   </a:solidFill>
@@ -24276,7 +24276,7 @@
             </a:ln>
             <a:extLst>
               <a:ext uri="{91240B29-F687-4f45-9708-019B960494DF}">
-                <a14:hiddenLine xmlns="" xmlns:a16="http://schemas.microsoft.com/office/drawing/2014/main" xmlns:p14="http://schemas.microsoft.com/office/powerpoint/2010/main" xmlns:a14="http://schemas.microsoft.com/office/drawing/2010/main" w="9525">
+                <a14:hiddenLine xmlns:a14="http://schemas.microsoft.com/office/drawing/2010/main" xmlns:p14="http://schemas.microsoft.com/office/powerpoint/2010/main" xmlns:a16="http://schemas.microsoft.com/office/drawing/2014/main" xmlns="" w="9525">
                   <a:solidFill>
                     <a:srgbClr val="000000"/>
                   </a:solidFill>
@@ -24378,7 +24378,7 @@
             </a:ln>
             <a:extLst>
               <a:ext uri="{91240B29-F687-4f45-9708-019B960494DF}">
-                <a14:hiddenLine xmlns="" xmlns:a16="http://schemas.microsoft.com/office/drawing/2014/main" xmlns:p14="http://schemas.microsoft.com/office/powerpoint/2010/main" xmlns:a14="http://schemas.microsoft.com/office/drawing/2010/main" w="9525">
+                <a14:hiddenLine xmlns:a14="http://schemas.microsoft.com/office/drawing/2010/main" xmlns:p14="http://schemas.microsoft.com/office/powerpoint/2010/main" xmlns:a16="http://schemas.microsoft.com/office/drawing/2014/main" xmlns="" w="9525">
                   <a:solidFill>
                     <a:srgbClr val="000000"/>
                   </a:solidFill>
@@ -24480,7 +24480,7 @@
             </a:ln>
             <a:extLst>
               <a:ext uri="{91240B29-F687-4f45-9708-019B960494DF}">
-                <a14:hiddenLine xmlns="" xmlns:a16="http://schemas.microsoft.com/office/drawing/2014/main" xmlns:p14="http://schemas.microsoft.com/office/powerpoint/2010/main" xmlns:a14="http://schemas.microsoft.com/office/drawing/2010/main" w="9525">
+                <a14:hiddenLine xmlns:a14="http://schemas.microsoft.com/office/drawing/2010/main" xmlns:p14="http://schemas.microsoft.com/office/powerpoint/2010/main" xmlns:a16="http://schemas.microsoft.com/office/drawing/2014/main" xmlns="" w="9525">
                   <a:solidFill>
                     <a:srgbClr val="000000"/>
                   </a:solidFill>
@@ -24557,7 +24557,7 @@
             </a:ln>
             <a:extLst>
               <a:ext uri="{91240B29-F687-4f45-9708-019B960494DF}">
-                <a14:hiddenLine xmlns="" xmlns:a16="http://schemas.microsoft.com/office/drawing/2014/main" xmlns:p14="http://schemas.microsoft.com/office/powerpoint/2010/main" xmlns:a14="http://schemas.microsoft.com/office/drawing/2010/main" w="9525">
+                <a14:hiddenLine xmlns:a14="http://schemas.microsoft.com/office/drawing/2010/main" xmlns:p14="http://schemas.microsoft.com/office/powerpoint/2010/main" xmlns:a16="http://schemas.microsoft.com/office/drawing/2014/main" xmlns="" w="9525">
                   <a:solidFill>
                     <a:srgbClr val="000000"/>
                   </a:solidFill>
@@ -24689,7 +24689,7 @@
             </a:ln>
             <a:extLst>
               <a:ext uri="{91240B29-F687-4f45-9708-019B960494DF}">
-                <a14:hiddenLine xmlns="" xmlns:a16="http://schemas.microsoft.com/office/drawing/2014/main" xmlns:p14="http://schemas.microsoft.com/office/powerpoint/2010/main" xmlns:a14="http://schemas.microsoft.com/office/drawing/2010/main" w="9525">
+                <a14:hiddenLine xmlns:a14="http://schemas.microsoft.com/office/drawing/2010/main" xmlns:p14="http://schemas.microsoft.com/office/powerpoint/2010/main" xmlns:a16="http://schemas.microsoft.com/office/drawing/2014/main" xmlns="" w="9525">
                   <a:solidFill>
                     <a:srgbClr val="000000"/>
                   </a:solidFill>
@@ -24813,7 +24813,7 @@
             </a:ln>
             <a:extLst>
               <a:ext uri="{91240B29-F687-4f45-9708-019B960494DF}">
-                <a14:hiddenLine xmlns="" xmlns:a16="http://schemas.microsoft.com/office/drawing/2014/main" xmlns:p14="http://schemas.microsoft.com/office/powerpoint/2010/main" xmlns:a14="http://schemas.microsoft.com/office/drawing/2010/main" w="9525">
+                <a14:hiddenLine xmlns:a14="http://schemas.microsoft.com/office/drawing/2010/main" xmlns:p14="http://schemas.microsoft.com/office/powerpoint/2010/main" xmlns:a16="http://schemas.microsoft.com/office/drawing/2014/main" xmlns="" w="9525">
                   <a:solidFill>
                     <a:srgbClr val="000000"/>
                   </a:solidFill>
@@ -24940,7 +24940,7 @@
             </a:ln>
             <a:extLst>
               <a:ext uri="{91240B29-F687-4f45-9708-019B960494DF}">
-                <a14:hiddenLine xmlns="" xmlns:a16="http://schemas.microsoft.com/office/drawing/2014/main" xmlns:p14="http://schemas.microsoft.com/office/powerpoint/2010/main" xmlns:a14="http://schemas.microsoft.com/office/drawing/2010/main" w="9525">
+                <a14:hiddenLine xmlns:a14="http://schemas.microsoft.com/office/drawing/2010/main" xmlns:p14="http://schemas.microsoft.com/office/powerpoint/2010/main" xmlns:a16="http://schemas.microsoft.com/office/drawing/2014/main" xmlns="" w="9525">
                   <a:solidFill>
                     <a:srgbClr val="000000"/>
                   </a:solidFill>
@@ -25042,7 +25042,7 @@
             </a:ln>
             <a:extLst>
               <a:ext uri="{91240B29-F687-4f45-9708-019B960494DF}">
-                <a14:hiddenLine xmlns="" xmlns:a16="http://schemas.microsoft.com/office/drawing/2014/main" xmlns:p14="http://schemas.microsoft.com/office/powerpoint/2010/main" xmlns:a14="http://schemas.microsoft.com/office/drawing/2010/main" w="9525">
+                <a14:hiddenLine xmlns:a14="http://schemas.microsoft.com/office/drawing/2010/main" xmlns:p14="http://schemas.microsoft.com/office/powerpoint/2010/main" xmlns:a16="http://schemas.microsoft.com/office/drawing/2014/main" xmlns="" w="9525">
                   <a:solidFill>
                     <a:srgbClr val="000000"/>
                   </a:solidFill>
@@ -25119,7 +25119,7 @@
             </a:ln>
             <a:extLst>
               <a:ext uri="{91240B29-F687-4f45-9708-019B960494DF}">
-                <a14:hiddenLine xmlns="" xmlns:a16="http://schemas.microsoft.com/office/drawing/2014/main" xmlns:p14="http://schemas.microsoft.com/office/powerpoint/2010/main" xmlns:a14="http://schemas.microsoft.com/office/drawing/2010/main" w="9525">
+                <a14:hiddenLine xmlns:a14="http://schemas.microsoft.com/office/drawing/2010/main" xmlns:p14="http://schemas.microsoft.com/office/powerpoint/2010/main" xmlns:a16="http://schemas.microsoft.com/office/drawing/2014/main" xmlns="" w="9525">
                   <a:solidFill>
                     <a:srgbClr val="000000"/>
                   </a:solidFill>
@@ -25221,7 +25221,7 @@
             </a:ln>
             <a:extLst>
               <a:ext uri="{91240B29-F687-4f45-9708-019B960494DF}">
-                <a14:hiddenLine xmlns="" xmlns:a16="http://schemas.microsoft.com/office/drawing/2014/main" xmlns:p14="http://schemas.microsoft.com/office/powerpoint/2010/main" xmlns:a14="http://schemas.microsoft.com/office/drawing/2010/main" w="9525">
+                <a14:hiddenLine xmlns:a14="http://schemas.microsoft.com/office/drawing/2010/main" xmlns:p14="http://schemas.microsoft.com/office/powerpoint/2010/main" xmlns:a16="http://schemas.microsoft.com/office/drawing/2014/main" xmlns="" w="9525">
                   <a:solidFill>
                     <a:srgbClr val="000000"/>
                   </a:solidFill>
@@ -25301,7 +25301,7 @@
             </a:ln>
             <a:extLst>
               <a:ext uri="{91240B29-F687-4f45-9708-019B960494DF}">
-                <a14:hiddenLine xmlns="" xmlns:a16="http://schemas.microsoft.com/office/drawing/2014/main" xmlns:p14="http://schemas.microsoft.com/office/powerpoint/2010/main" xmlns:a14="http://schemas.microsoft.com/office/drawing/2010/main" w="9525">
+                <a14:hiddenLine xmlns:a14="http://schemas.microsoft.com/office/drawing/2010/main" xmlns:p14="http://schemas.microsoft.com/office/powerpoint/2010/main" xmlns:a16="http://schemas.microsoft.com/office/drawing/2014/main" xmlns="" w="9525">
                   <a:solidFill>
                     <a:srgbClr val="000000"/>
                   </a:solidFill>
@@ -25403,7 +25403,7 @@
             </a:ln>
             <a:extLst>
               <a:ext uri="{91240B29-F687-4f45-9708-019B960494DF}">
-                <a14:hiddenLine xmlns="" xmlns:a16="http://schemas.microsoft.com/office/drawing/2014/main" xmlns:p14="http://schemas.microsoft.com/office/powerpoint/2010/main" xmlns:a14="http://schemas.microsoft.com/office/drawing/2010/main" w="9525">
+                <a14:hiddenLine xmlns:a14="http://schemas.microsoft.com/office/drawing/2010/main" xmlns:p14="http://schemas.microsoft.com/office/powerpoint/2010/main" xmlns:a16="http://schemas.microsoft.com/office/drawing/2014/main" xmlns="" w="9525">
                   <a:solidFill>
                     <a:srgbClr val="000000"/>
                   </a:solidFill>
@@ -25483,7 +25483,7 @@
             </a:ln>
             <a:extLst>
               <a:ext uri="{91240B29-F687-4f45-9708-019B960494DF}">
-                <a14:hiddenLine xmlns="" xmlns:a16="http://schemas.microsoft.com/office/drawing/2014/main" xmlns:p14="http://schemas.microsoft.com/office/powerpoint/2010/main" xmlns:a14="http://schemas.microsoft.com/office/drawing/2010/main" w="9525">
+                <a14:hiddenLine xmlns:a14="http://schemas.microsoft.com/office/drawing/2010/main" xmlns:p14="http://schemas.microsoft.com/office/powerpoint/2010/main" xmlns:a16="http://schemas.microsoft.com/office/drawing/2014/main" xmlns="" w="9525">
                   <a:solidFill>
                     <a:srgbClr val="000000"/>
                   </a:solidFill>
@@ -25585,7 +25585,7 @@
             </a:ln>
             <a:extLst>
               <a:ext uri="{91240B29-F687-4f45-9708-019B960494DF}">
-                <a14:hiddenLine xmlns="" xmlns:a16="http://schemas.microsoft.com/office/drawing/2014/main" xmlns:p14="http://schemas.microsoft.com/office/powerpoint/2010/main" xmlns:a14="http://schemas.microsoft.com/office/drawing/2010/main" w="9525">
+                <a14:hiddenLine xmlns:a14="http://schemas.microsoft.com/office/drawing/2010/main" xmlns:p14="http://schemas.microsoft.com/office/powerpoint/2010/main" xmlns:a16="http://schemas.microsoft.com/office/drawing/2014/main" xmlns="" w="9525">
                   <a:solidFill>
                     <a:srgbClr val="000000"/>
                   </a:solidFill>
@@ -25631,7 +25631,7 @@
             </a:ln>
             <a:extLst>
               <a:ext uri="{91240B29-F687-4f45-9708-019B960494DF}">
-                <a14:hiddenLine xmlns="" xmlns:a16="http://schemas.microsoft.com/office/drawing/2014/main" xmlns:p14="http://schemas.microsoft.com/office/powerpoint/2010/main" xmlns:a14="http://schemas.microsoft.com/office/drawing/2010/main" w="9525">
+                <a14:hiddenLine xmlns:a14="http://schemas.microsoft.com/office/drawing/2010/main" xmlns:p14="http://schemas.microsoft.com/office/powerpoint/2010/main" xmlns:a16="http://schemas.microsoft.com/office/drawing/2014/main" xmlns="" w="9525">
                   <a:solidFill>
                     <a:srgbClr val="000000"/>
                   </a:solidFill>
@@ -25674,7 +25674,7 @@
           <a:p>
             <a:r>
               <a:rPr lang="fr-CA" dirty="0"/>
-              <a:t>Définition du problème</a:t>
+              <a:t>CALENDRIER DU PROJET</a:t>
             </a:r>
           </a:p>
         </p:txBody>
@@ -25889,7 +25889,7 @@
             </a:ln>
             <a:extLst>
               <a:ext uri="{91240B29-F687-4f45-9708-019B960494DF}">
-                <a14:hiddenLine xmlns="" xmlns:a16="http://schemas.microsoft.com/office/drawing/2014/main" xmlns:p14="http://schemas.microsoft.com/office/powerpoint/2010/main" xmlns:a14="http://schemas.microsoft.com/office/drawing/2010/main" w="9525">
+                <a14:hiddenLine xmlns:a14="http://schemas.microsoft.com/office/drawing/2010/main" xmlns:p14="http://schemas.microsoft.com/office/powerpoint/2010/main" xmlns:a16="http://schemas.microsoft.com/office/drawing/2014/main" xmlns="" w="9525">
                   <a:solidFill>
                     <a:srgbClr val="000000"/>
                   </a:solidFill>
@@ -25991,7 +25991,7 @@
             </a:ln>
             <a:extLst>
               <a:ext uri="{91240B29-F687-4f45-9708-019B960494DF}">
-                <a14:hiddenLine xmlns="" xmlns:a16="http://schemas.microsoft.com/office/drawing/2014/main" xmlns:p14="http://schemas.microsoft.com/office/powerpoint/2010/main" xmlns:a14="http://schemas.microsoft.com/office/drawing/2010/main" w="9525">
+                <a14:hiddenLine xmlns:a14="http://schemas.microsoft.com/office/drawing/2010/main" xmlns:p14="http://schemas.microsoft.com/office/powerpoint/2010/main" xmlns:a16="http://schemas.microsoft.com/office/drawing/2014/main" xmlns="" w="9525">
                   <a:solidFill>
                     <a:srgbClr val="000000"/>
                   </a:solidFill>
@@ -26093,7 +26093,7 @@
             </a:ln>
             <a:extLst>
               <a:ext uri="{91240B29-F687-4f45-9708-019B960494DF}">
-                <a14:hiddenLine xmlns="" xmlns:a16="http://schemas.microsoft.com/office/drawing/2014/main" xmlns:p14="http://schemas.microsoft.com/office/powerpoint/2010/main" xmlns:a14="http://schemas.microsoft.com/office/drawing/2010/main" w="9525">
+                <a14:hiddenLine xmlns:a14="http://schemas.microsoft.com/office/drawing/2010/main" xmlns:p14="http://schemas.microsoft.com/office/powerpoint/2010/main" xmlns:a16="http://schemas.microsoft.com/office/drawing/2014/main" xmlns="" w="9525">
                   <a:solidFill>
                     <a:srgbClr val="000000"/>
                   </a:solidFill>
@@ -26167,7 +26167,7 @@
             </a:ln>
             <a:extLst>
               <a:ext uri="{91240B29-F687-4f45-9708-019B960494DF}">
-                <a14:hiddenLine xmlns="" xmlns:a16="http://schemas.microsoft.com/office/drawing/2014/main" xmlns:p14="http://schemas.microsoft.com/office/powerpoint/2010/main" xmlns:a14="http://schemas.microsoft.com/office/drawing/2010/main" w="9525">
+                <a14:hiddenLine xmlns:a14="http://schemas.microsoft.com/office/drawing/2010/main" xmlns:p14="http://schemas.microsoft.com/office/powerpoint/2010/main" xmlns:a16="http://schemas.microsoft.com/office/drawing/2014/main" xmlns="" w="9525">
                   <a:solidFill>
                     <a:srgbClr val="000000"/>
                   </a:solidFill>
@@ -26269,7 +26269,7 @@
             </a:ln>
             <a:extLst>
               <a:ext uri="{91240B29-F687-4f45-9708-019B960494DF}">
-                <a14:hiddenLine xmlns="" xmlns:a16="http://schemas.microsoft.com/office/drawing/2014/main" xmlns:p14="http://schemas.microsoft.com/office/powerpoint/2010/main" xmlns:a14="http://schemas.microsoft.com/office/drawing/2010/main" w="9525">
+                <a14:hiddenLine xmlns:a14="http://schemas.microsoft.com/office/drawing/2010/main" xmlns:p14="http://schemas.microsoft.com/office/powerpoint/2010/main" xmlns:a16="http://schemas.microsoft.com/office/drawing/2014/main" xmlns="" w="9525">
                   <a:solidFill>
                     <a:srgbClr val="000000"/>
                   </a:solidFill>
@@ -26343,7 +26343,7 @@
             </a:ln>
             <a:extLst>
               <a:ext uri="{91240B29-F687-4f45-9708-019B960494DF}">
-                <a14:hiddenLine xmlns="" xmlns:a16="http://schemas.microsoft.com/office/drawing/2014/main" xmlns:p14="http://schemas.microsoft.com/office/powerpoint/2010/main" xmlns:a14="http://schemas.microsoft.com/office/drawing/2010/main" w="9525">
+                <a14:hiddenLine xmlns:a14="http://schemas.microsoft.com/office/drawing/2010/main" xmlns:p14="http://schemas.microsoft.com/office/powerpoint/2010/main" xmlns:a16="http://schemas.microsoft.com/office/drawing/2014/main" xmlns="" w="9525">
                   <a:solidFill>
                     <a:srgbClr val="000000"/>
                   </a:solidFill>
@@ -26417,7 +26417,7 @@
             </a:ln>
             <a:extLst>
               <a:ext uri="{91240B29-F687-4f45-9708-019B960494DF}">
-                <a14:hiddenLine xmlns="" xmlns:a16="http://schemas.microsoft.com/office/drawing/2014/main" xmlns:p14="http://schemas.microsoft.com/office/powerpoint/2010/main" xmlns:a14="http://schemas.microsoft.com/office/drawing/2010/main" w="9525">
+                <a14:hiddenLine xmlns:a14="http://schemas.microsoft.com/office/drawing/2010/main" xmlns:p14="http://schemas.microsoft.com/office/powerpoint/2010/main" xmlns:a16="http://schemas.microsoft.com/office/drawing/2014/main" xmlns="" w="9525">
                   <a:solidFill>
                     <a:srgbClr val="000000"/>
                   </a:solidFill>
@@ -26519,7 +26519,7 @@
             </a:ln>
             <a:extLst>
               <a:ext uri="{91240B29-F687-4f45-9708-019B960494DF}">
-                <a14:hiddenLine xmlns="" xmlns:a16="http://schemas.microsoft.com/office/drawing/2014/main" xmlns:p14="http://schemas.microsoft.com/office/powerpoint/2010/main" xmlns:a14="http://schemas.microsoft.com/office/drawing/2010/main" w="9525">
+                <a14:hiddenLine xmlns:a14="http://schemas.microsoft.com/office/drawing/2010/main" xmlns:p14="http://schemas.microsoft.com/office/powerpoint/2010/main" xmlns:a16="http://schemas.microsoft.com/office/drawing/2014/main" xmlns="" w="9525">
                   <a:solidFill>
                     <a:srgbClr val="000000"/>
                   </a:solidFill>
@@ -26621,7 +26621,7 @@
             </a:ln>
             <a:extLst>
               <a:ext uri="{91240B29-F687-4f45-9708-019B960494DF}">
-                <a14:hiddenLine xmlns="" xmlns:a16="http://schemas.microsoft.com/office/drawing/2014/main" xmlns:p14="http://schemas.microsoft.com/office/powerpoint/2010/main" xmlns:a14="http://schemas.microsoft.com/office/drawing/2010/main" w="9525">
+                <a14:hiddenLine xmlns:a14="http://schemas.microsoft.com/office/drawing/2010/main" xmlns:p14="http://schemas.microsoft.com/office/powerpoint/2010/main" xmlns:a16="http://schemas.microsoft.com/office/drawing/2014/main" xmlns="" w="9525">
                   <a:solidFill>
                     <a:srgbClr val="000000"/>
                   </a:solidFill>
@@ -26695,7 +26695,7 @@
             </a:ln>
             <a:extLst>
               <a:ext uri="{91240B29-F687-4f45-9708-019B960494DF}">
-                <a14:hiddenLine xmlns="" xmlns:a16="http://schemas.microsoft.com/office/drawing/2014/main" xmlns:p14="http://schemas.microsoft.com/office/powerpoint/2010/main" xmlns:a14="http://schemas.microsoft.com/office/drawing/2010/main" w="9525">
+                <a14:hiddenLine xmlns:a14="http://schemas.microsoft.com/office/drawing/2010/main" xmlns:p14="http://schemas.microsoft.com/office/powerpoint/2010/main" xmlns:a16="http://schemas.microsoft.com/office/drawing/2014/main" xmlns="" w="9525">
                   <a:solidFill>
                     <a:srgbClr val="000000"/>
                   </a:solidFill>
@@ -26817,7 +26817,7 @@
             </a:ln>
             <a:extLst>
               <a:ext uri="{91240B29-F687-4f45-9708-019B960494DF}">
-                <a14:hiddenLine xmlns="" xmlns:a16="http://schemas.microsoft.com/office/drawing/2014/main" xmlns:p14="http://schemas.microsoft.com/office/powerpoint/2010/main" xmlns:a14="http://schemas.microsoft.com/office/drawing/2010/main" w="9525">
+                <a14:hiddenLine xmlns:a14="http://schemas.microsoft.com/office/drawing/2010/main" xmlns:p14="http://schemas.microsoft.com/office/powerpoint/2010/main" xmlns:a16="http://schemas.microsoft.com/office/drawing/2014/main" xmlns="" w="9525">
                   <a:solidFill>
                     <a:srgbClr val="000000"/>
                   </a:solidFill>
@@ -26925,7 +26925,7 @@
             </a:ln>
             <a:extLst>
               <a:ext uri="{91240B29-F687-4f45-9708-019B960494DF}">
-                <a14:hiddenLine xmlns="" xmlns:a16="http://schemas.microsoft.com/office/drawing/2014/main" xmlns:p14="http://schemas.microsoft.com/office/powerpoint/2010/main" xmlns:a14="http://schemas.microsoft.com/office/drawing/2010/main" w="9525">
+                <a14:hiddenLine xmlns:a14="http://schemas.microsoft.com/office/drawing/2010/main" xmlns:p14="http://schemas.microsoft.com/office/powerpoint/2010/main" xmlns:a16="http://schemas.microsoft.com/office/drawing/2014/main" xmlns="" w="9525">
                   <a:solidFill>
                     <a:srgbClr val="000000"/>
                   </a:solidFill>
@@ -26999,7 +26999,7 @@
             </a:ln>
             <a:extLst>
               <a:ext uri="{91240B29-F687-4f45-9708-019B960494DF}">
-                <a14:hiddenLine xmlns="" xmlns:a16="http://schemas.microsoft.com/office/drawing/2014/main" xmlns:p14="http://schemas.microsoft.com/office/powerpoint/2010/main" xmlns:a14="http://schemas.microsoft.com/office/drawing/2010/main" w="9525">
+                <a14:hiddenLine xmlns:a14="http://schemas.microsoft.com/office/drawing/2010/main" xmlns:p14="http://schemas.microsoft.com/office/powerpoint/2010/main" xmlns:a16="http://schemas.microsoft.com/office/drawing/2014/main" xmlns="" w="9525">
                   <a:solidFill>
                     <a:srgbClr val="000000"/>
                   </a:solidFill>
@@ -27073,7 +27073,7 @@
             </a:ln>
             <a:extLst>
               <a:ext uri="{91240B29-F687-4f45-9708-019B960494DF}">
-                <a14:hiddenLine xmlns="" xmlns:a16="http://schemas.microsoft.com/office/drawing/2014/main" xmlns:p14="http://schemas.microsoft.com/office/powerpoint/2010/main" xmlns:a14="http://schemas.microsoft.com/office/drawing/2010/main" w="9525">
+                <a14:hiddenLine xmlns:a14="http://schemas.microsoft.com/office/drawing/2010/main" xmlns:p14="http://schemas.microsoft.com/office/powerpoint/2010/main" xmlns:a16="http://schemas.microsoft.com/office/drawing/2014/main" xmlns="" w="9525">
                   <a:solidFill>
                     <a:srgbClr val="000000"/>
                   </a:solidFill>
@@ -27175,7 +27175,7 @@
             </a:ln>
             <a:extLst>
               <a:ext uri="{91240B29-F687-4f45-9708-019B960494DF}">
-                <a14:hiddenLine xmlns="" xmlns:a16="http://schemas.microsoft.com/office/drawing/2014/main" xmlns:p14="http://schemas.microsoft.com/office/powerpoint/2010/main" xmlns:a14="http://schemas.microsoft.com/office/drawing/2010/main" w="9525">
+                <a14:hiddenLine xmlns:a14="http://schemas.microsoft.com/office/drawing/2010/main" xmlns:p14="http://schemas.microsoft.com/office/powerpoint/2010/main" xmlns:a16="http://schemas.microsoft.com/office/drawing/2014/main" xmlns="" w="9525">
                   <a:solidFill>
                     <a:srgbClr val="000000"/>
                   </a:solidFill>
@@ -27221,7 +27221,7 @@
             </a:ln>
             <a:extLst>
               <a:ext uri="{91240B29-F687-4f45-9708-019B960494DF}">
-                <a14:hiddenLine xmlns="" xmlns:a16="http://schemas.microsoft.com/office/drawing/2014/main" xmlns:p14="http://schemas.microsoft.com/office/powerpoint/2010/main" xmlns:a14="http://schemas.microsoft.com/office/drawing/2010/main" w="9525">
+                <a14:hiddenLine xmlns:a14="http://schemas.microsoft.com/office/drawing/2010/main" xmlns:p14="http://schemas.microsoft.com/office/powerpoint/2010/main" xmlns:a16="http://schemas.microsoft.com/office/drawing/2014/main" xmlns="" w="9525">
                   <a:solidFill>
                     <a:srgbClr val="000000"/>
                   </a:solidFill>
@@ -27298,7 +27298,7 @@
             </a:ln>
             <a:extLst>
               <a:ext uri="{91240B29-F687-4f45-9708-019B960494DF}">
-                <a14:hiddenLine xmlns="" xmlns:a16="http://schemas.microsoft.com/office/drawing/2014/main" xmlns:p14="http://schemas.microsoft.com/office/powerpoint/2010/main" xmlns:a14="http://schemas.microsoft.com/office/drawing/2010/main" w="9525">
+                <a14:hiddenLine xmlns:a14="http://schemas.microsoft.com/office/drawing/2010/main" xmlns:p14="http://schemas.microsoft.com/office/powerpoint/2010/main" xmlns:a16="http://schemas.microsoft.com/office/drawing/2014/main" xmlns="" w="9525">
                   <a:solidFill>
                     <a:srgbClr val="000000"/>
                   </a:solidFill>
@@ -27400,7 +27400,7 @@
             </a:ln>
             <a:extLst>
               <a:ext uri="{91240B29-F687-4f45-9708-019B960494DF}">
-                <a14:hiddenLine xmlns="" xmlns:a16="http://schemas.microsoft.com/office/drawing/2014/main" xmlns:p14="http://schemas.microsoft.com/office/powerpoint/2010/main" xmlns:a14="http://schemas.microsoft.com/office/drawing/2010/main" w="9525">
+                <a14:hiddenLine xmlns:a14="http://schemas.microsoft.com/office/drawing/2010/main" xmlns:p14="http://schemas.microsoft.com/office/powerpoint/2010/main" xmlns:a16="http://schemas.microsoft.com/office/drawing/2014/main" xmlns="" w="9525">
                   <a:solidFill>
                     <a:srgbClr val="000000"/>
                   </a:solidFill>
@@ -27474,7 +27474,7 @@
             </a:ln>
             <a:extLst>
               <a:ext uri="{91240B29-F687-4f45-9708-019B960494DF}">
-                <a14:hiddenLine xmlns="" xmlns:a16="http://schemas.microsoft.com/office/drawing/2014/main" xmlns:p14="http://schemas.microsoft.com/office/powerpoint/2010/main" xmlns:a14="http://schemas.microsoft.com/office/drawing/2010/main" w="9525">
+                <a14:hiddenLine xmlns:a14="http://schemas.microsoft.com/office/drawing/2010/main" xmlns:p14="http://schemas.microsoft.com/office/powerpoint/2010/main" xmlns:a16="http://schemas.microsoft.com/office/drawing/2014/main" xmlns="" w="9525">
                   <a:solidFill>
                     <a:srgbClr val="000000"/>
                   </a:solidFill>
@@ -27576,7 +27576,7 @@
             </a:ln>
             <a:extLst>
               <a:ext uri="{91240B29-F687-4f45-9708-019B960494DF}">
-                <a14:hiddenLine xmlns="" xmlns:a16="http://schemas.microsoft.com/office/drawing/2014/main" xmlns:p14="http://schemas.microsoft.com/office/powerpoint/2010/main" xmlns:a14="http://schemas.microsoft.com/office/drawing/2010/main" w="9525">
+                <a14:hiddenLine xmlns:a14="http://schemas.microsoft.com/office/drawing/2010/main" xmlns:p14="http://schemas.microsoft.com/office/powerpoint/2010/main" xmlns:a16="http://schemas.microsoft.com/office/drawing/2014/main" xmlns="" w="9525">
                   <a:solidFill>
                     <a:srgbClr val="000000"/>
                   </a:solidFill>
@@ -27653,7 +27653,7 @@
             </a:ln>
             <a:extLst>
               <a:ext uri="{91240B29-F687-4f45-9708-019B960494DF}">
-                <a14:hiddenLine xmlns="" xmlns:a16="http://schemas.microsoft.com/office/drawing/2014/main" xmlns:p14="http://schemas.microsoft.com/office/powerpoint/2010/main" xmlns:a14="http://schemas.microsoft.com/office/drawing/2010/main" w="9525">
+                <a14:hiddenLine xmlns:a14="http://schemas.microsoft.com/office/drawing/2010/main" xmlns:p14="http://schemas.microsoft.com/office/powerpoint/2010/main" xmlns:a16="http://schemas.microsoft.com/office/drawing/2014/main" xmlns="" w="9525">
                   <a:solidFill>
                     <a:srgbClr val="000000"/>
                   </a:solidFill>
@@ -27727,7 +27727,7 @@
             </a:ln>
             <a:extLst>
               <a:ext uri="{91240B29-F687-4f45-9708-019B960494DF}">
-                <a14:hiddenLine xmlns="" xmlns:a16="http://schemas.microsoft.com/office/drawing/2014/main" xmlns:p14="http://schemas.microsoft.com/office/powerpoint/2010/main" xmlns:a14="http://schemas.microsoft.com/office/drawing/2010/main" w="9525">
+                <a14:hiddenLine xmlns:a14="http://schemas.microsoft.com/office/drawing/2010/main" xmlns:p14="http://schemas.microsoft.com/office/powerpoint/2010/main" xmlns:a16="http://schemas.microsoft.com/office/drawing/2014/main" xmlns="" w="9525">
                   <a:solidFill>
                     <a:srgbClr val="000000"/>
                   </a:solidFill>
@@ -27829,7 +27829,7 @@
             </a:ln>
             <a:extLst>
               <a:ext uri="{91240B29-F687-4f45-9708-019B960494DF}">
-                <a14:hiddenLine xmlns="" xmlns:a16="http://schemas.microsoft.com/office/drawing/2014/main" xmlns:p14="http://schemas.microsoft.com/office/powerpoint/2010/main" xmlns:a14="http://schemas.microsoft.com/office/drawing/2010/main" w="9525">
+                <a14:hiddenLine xmlns:a14="http://schemas.microsoft.com/office/drawing/2010/main" xmlns:p14="http://schemas.microsoft.com/office/powerpoint/2010/main" xmlns:a16="http://schemas.microsoft.com/office/drawing/2014/main" xmlns="" w="9525">
                   <a:solidFill>
                     <a:srgbClr val="000000"/>
                   </a:solidFill>
@@ -27931,7 +27931,7 @@
             </a:ln>
             <a:extLst>
               <a:ext uri="{91240B29-F687-4f45-9708-019B960494DF}">
-                <a14:hiddenLine xmlns="" xmlns:a16="http://schemas.microsoft.com/office/drawing/2014/main" xmlns:p14="http://schemas.microsoft.com/office/powerpoint/2010/main" xmlns:a14="http://schemas.microsoft.com/office/drawing/2010/main" w="9525">
+                <a14:hiddenLine xmlns:a14="http://schemas.microsoft.com/office/drawing/2010/main" xmlns:p14="http://schemas.microsoft.com/office/powerpoint/2010/main" xmlns:a16="http://schemas.microsoft.com/office/drawing/2014/main" xmlns="" w="9525">
                   <a:solidFill>
                     <a:srgbClr val="000000"/>
                   </a:solidFill>
@@ -28008,7 +28008,7 @@
             </a:ln>
             <a:extLst>
               <a:ext uri="{91240B29-F687-4f45-9708-019B960494DF}">
-                <a14:hiddenLine xmlns="" xmlns:a16="http://schemas.microsoft.com/office/drawing/2014/main" xmlns:p14="http://schemas.microsoft.com/office/powerpoint/2010/main" xmlns:a14="http://schemas.microsoft.com/office/drawing/2010/main" w="9525">
+                <a14:hiddenLine xmlns:a14="http://schemas.microsoft.com/office/drawing/2010/main" xmlns:p14="http://schemas.microsoft.com/office/powerpoint/2010/main" xmlns:a16="http://schemas.microsoft.com/office/drawing/2014/main" xmlns="" w="9525">
                   <a:solidFill>
                     <a:srgbClr val="000000"/>
                   </a:solidFill>
@@ -28140,7 +28140,7 @@
             </a:ln>
             <a:extLst>
               <a:ext uri="{91240B29-F687-4f45-9708-019B960494DF}">
-                <a14:hiddenLine xmlns="" xmlns:a16="http://schemas.microsoft.com/office/drawing/2014/main" xmlns:p14="http://schemas.microsoft.com/office/powerpoint/2010/main" xmlns:a14="http://schemas.microsoft.com/office/drawing/2010/main" w="9525">
+                <a14:hiddenLine xmlns:a14="http://schemas.microsoft.com/office/drawing/2010/main" xmlns:p14="http://schemas.microsoft.com/office/powerpoint/2010/main" xmlns:a16="http://schemas.microsoft.com/office/drawing/2014/main" xmlns="" w="9525">
                   <a:solidFill>
                     <a:srgbClr val="000000"/>
                   </a:solidFill>
@@ -28264,7 +28264,7 @@
             </a:ln>
             <a:extLst>
               <a:ext uri="{91240B29-F687-4f45-9708-019B960494DF}">
-                <a14:hiddenLine xmlns="" xmlns:a16="http://schemas.microsoft.com/office/drawing/2014/main" xmlns:p14="http://schemas.microsoft.com/office/powerpoint/2010/main" xmlns:a14="http://schemas.microsoft.com/office/drawing/2010/main" w="9525">
+                <a14:hiddenLine xmlns:a14="http://schemas.microsoft.com/office/drawing/2010/main" xmlns:p14="http://schemas.microsoft.com/office/powerpoint/2010/main" xmlns:a16="http://schemas.microsoft.com/office/drawing/2014/main" xmlns="" w="9525">
                   <a:solidFill>
                     <a:srgbClr val="000000"/>
                   </a:solidFill>
@@ -28391,7 +28391,7 @@
             </a:ln>
             <a:extLst>
               <a:ext uri="{91240B29-F687-4f45-9708-019B960494DF}">
-                <a14:hiddenLine xmlns="" xmlns:a16="http://schemas.microsoft.com/office/drawing/2014/main" xmlns:p14="http://schemas.microsoft.com/office/powerpoint/2010/main" xmlns:a14="http://schemas.microsoft.com/office/drawing/2010/main" w="9525">
+                <a14:hiddenLine xmlns:a14="http://schemas.microsoft.com/office/drawing/2010/main" xmlns:p14="http://schemas.microsoft.com/office/powerpoint/2010/main" xmlns:a16="http://schemas.microsoft.com/office/drawing/2014/main" xmlns="" w="9525">
                   <a:solidFill>
                     <a:srgbClr val="000000"/>
                   </a:solidFill>
@@ -28493,7 +28493,7 @@
             </a:ln>
             <a:extLst>
               <a:ext uri="{91240B29-F687-4f45-9708-019B960494DF}">
-                <a14:hiddenLine xmlns="" xmlns:a16="http://schemas.microsoft.com/office/drawing/2014/main" xmlns:p14="http://schemas.microsoft.com/office/powerpoint/2010/main" xmlns:a14="http://schemas.microsoft.com/office/drawing/2010/main" w="9525">
+                <a14:hiddenLine xmlns:a14="http://schemas.microsoft.com/office/drawing/2010/main" xmlns:p14="http://schemas.microsoft.com/office/powerpoint/2010/main" xmlns:a16="http://schemas.microsoft.com/office/drawing/2014/main" xmlns="" w="9525">
                   <a:solidFill>
                     <a:srgbClr val="000000"/>
                   </a:solidFill>
@@ -28570,7 +28570,7 @@
             </a:ln>
             <a:extLst>
               <a:ext uri="{91240B29-F687-4f45-9708-019B960494DF}">
-                <a14:hiddenLine xmlns="" xmlns:a16="http://schemas.microsoft.com/office/drawing/2014/main" xmlns:p14="http://schemas.microsoft.com/office/powerpoint/2010/main" xmlns:a14="http://schemas.microsoft.com/office/drawing/2010/main" w="9525">
+                <a14:hiddenLine xmlns:a14="http://schemas.microsoft.com/office/drawing/2010/main" xmlns:p14="http://schemas.microsoft.com/office/powerpoint/2010/main" xmlns:a16="http://schemas.microsoft.com/office/drawing/2014/main" xmlns="" w="9525">
                   <a:solidFill>
                     <a:srgbClr val="000000"/>
                   </a:solidFill>
@@ -28672,7 +28672,7 @@
             </a:ln>
             <a:extLst>
               <a:ext uri="{91240B29-F687-4f45-9708-019B960494DF}">
-                <a14:hiddenLine xmlns="" xmlns:a16="http://schemas.microsoft.com/office/drawing/2014/main" xmlns:p14="http://schemas.microsoft.com/office/powerpoint/2010/main" xmlns:a14="http://schemas.microsoft.com/office/drawing/2010/main" w="9525">
+                <a14:hiddenLine xmlns:a14="http://schemas.microsoft.com/office/drawing/2010/main" xmlns:p14="http://schemas.microsoft.com/office/powerpoint/2010/main" xmlns:a16="http://schemas.microsoft.com/office/drawing/2014/main" xmlns="" w="9525">
                   <a:solidFill>
                     <a:srgbClr val="000000"/>
                   </a:solidFill>
@@ -28752,7 +28752,7 @@
             </a:ln>
             <a:extLst>
               <a:ext uri="{91240B29-F687-4f45-9708-019B960494DF}">
-                <a14:hiddenLine xmlns="" xmlns:a16="http://schemas.microsoft.com/office/drawing/2014/main" xmlns:p14="http://schemas.microsoft.com/office/powerpoint/2010/main" xmlns:a14="http://schemas.microsoft.com/office/drawing/2010/main" w="9525">
+                <a14:hiddenLine xmlns:a14="http://schemas.microsoft.com/office/drawing/2010/main" xmlns:p14="http://schemas.microsoft.com/office/powerpoint/2010/main" xmlns:a16="http://schemas.microsoft.com/office/drawing/2014/main" xmlns="" w="9525">
                   <a:solidFill>
                     <a:srgbClr val="000000"/>
                   </a:solidFill>
@@ -28854,7 +28854,7 @@
             </a:ln>
             <a:extLst>
               <a:ext uri="{91240B29-F687-4f45-9708-019B960494DF}">
-                <a14:hiddenLine xmlns="" xmlns:a16="http://schemas.microsoft.com/office/drawing/2014/main" xmlns:p14="http://schemas.microsoft.com/office/powerpoint/2010/main" xmlns:a14="http://schemas.microsoft.com/office/drawing/2010/main" w="9525">
+                <a14:hiddenLine xmlns:a14="http://schemas.microsoft.com/office/drawing/2010/main" xmlns:p14="http://schemas.microsoft.com/office/powerpoint/2010/main" xmlns:a16="http://schemas.microsoft.com/office/drawing/2014/main" xmlns="" w="9525">
                   <a:solidFill>
                     <a:srgbClr val="000000"/>
                   </a:solidFill>
@@ -28934,7 +28934,7 @@
             </a:ln>
             <a:extLst>
               <a:ext uri="{91240B29-F687-4f45-9708-019B960494DF}">
-                <a14:hiddenLine xmlns="" xmlns:a16="http://schemas.microsoft.com/office/drawing/2014/main" xmlns:p14="http://schemas.microsoft.com/office/powerpoint/2010/main" xmlns:a14="http://schemas.microsoft.com/office/drawing/2010/main" w="9525">
+                <a14:hiddenLine xmlns:a14="http://schemas.microsoft.com/office/drawing/2010/main" xmlns:p14="http://schemas.microsoft.com/office/powerpoint/2010/main" xmlns:a16="http://schemas.microsoft.com/office/drawing/2014/main" xmlns="" w="9525">
                   <a:solidFill>
                     <a:srgbClr val="000000"/>
                   </a:solidFill>
@@ -29036,7 +29036,7 @@
             </a:ln>
             <a:extLst>
               <a:ext uri="{91240B29-F687-4f45-9708-019B960494DF}">
-                <a14:hiddenLine xmlns="" xmlns:a16="http://schemas.microsoft.com/office/drawing/2014/main" xmlns:p14="http://schemas.microsoft.com/office/powerpoint/2010/main" xmlns:a14="http://schemas.microsoft.com/office/drawing/2010/main" w="9525">
+                <a14:hiddenLine xmlns:a14="http://schemas.microsoft.com/office/drawing/2010/main" xmlns:p14="http://schemas.microsoft.com/office/powerpoint/2010/main" xmlns:a16="http://schemas.microsoft.com/office/drawing/2014/main" xmlns="" w="9525">
                   <a:solidFill>
                     <a:srgbClr val="000000"/>
                   </a:solidFill>
@@ -29082,7 +29082,7 @@
             </a:ln>
             <a:extLst>
               <a:ext uri="{91240B29-F687-4f45-9708-019B960494DF}">
-                <a14:hiddenLine xmlns="" xmlns:a16="http://schemas.microsoft.com/office/drawing/2014/main" xmlns:p14="http://schemas.microsoft.com/office/powerpoint/2010/main" xmlns:a14="http://schemas.microsoft.com/office/drawing/2010/main" w="9525">
+                <a14:hiddenLine xmlns:a14="http://schemas.microsoft.com/office/drawing/2010/main" xmlns:p14="http://schemas.microsoft.com/office/powerpoint/2010/main" xmlns:a16="http://schemas.microsoft.com/office/drawing/2014/main" xmlns="" w="9525">
                   <a:solidFill>
                     <a:srgbClr val="000000"/>
                   </a:solidFill>

</xml_diff>